<commit_message>
Update slide for testing Users page.
</commit_message>
<xml_diff>
--- a/Test Plan.pptx
+++ b/Test Plan.pptx
@@ -111,6 +111,11 @@
       </a:defRPr>
     </a:lvl9pPr>
   </p:defaultTextStyle>
+  <p:extLst>
+    <p:ext uri="{EFAFB233-063F-42B5-8137-9DF3F51BA10A}">
+      <p15:sldGuideLst xmlns:p15="http://schemas.microsoft.com/office/powerpoint/2012/main"/>
+    </p:ext>
+  </p:extLst>
 </p:presentation>
 </file>
 
@@ -261,7 +266,7 @@
           <a:p>
             <a:fld id="{7E5197F0-50BA-46ED-B704-23702634247F}" type="datetimeFigureOut">
               <a:rPr lang="en-US" smtClean="0"/>
-              <a:t>11/12/2018</a:t>
+              <a:t>11/16/2018</a:t>
             </a:fld>
             <a:endParaRPr lang="en-US"/>
           </a:p>
@@ -459,7 +464,7 @@
           <a:p>
             <a:fld id="{7E5197F0-50BA-46ED-B704-23702634247F}" type="datetimeFigureOut">
               <a:rPr lang="en-US" smtClean="0"/>
-              <a:t>11/12/2018</a:t>
+              <a:t>11/16/2018</a:t>
             </a:fld>
             <a:endParaRPr lang="en-US"/>
           </a:p>
@@ -667,7 +672,7 @@
           <a:p>
             <a:fld id="{7E5197F0-50BA-46ED-B704-23702634247F}" type="datetimeFigureOut">
               <a:rPr lang="en-US" smtClean="0"/>
-              <a:t>11/12/2018</a:t>
+              <a:t>11/16/2018</a:t>
             </a:fld>
             <a:endParaRPr lang="en-US"/>
           </a:p>
@@ -865,7 +870,7 @@
           <a:p>
             <a:fld id="{7E5197F0-50BA-46ED-B704-23702634247F}" type="datetimeFigureOut">
               <a:rPr lang="en-US" smtClean="0"/>
-              <a:t>11/12/2018</a:t>
+              <a:t>11/16/2018</a:t>
             </a:fld>
             <a:endParaRPr lang="en-US"/>
           </a:p>
@@ -1140,7 +1145,7 @@
           <a:p>
             <a:fld id="{7E5197F0-50BA-46ED-B704-23702634247F}" type="datetimeFigureOut">
               <a:rPr lang="en-US" smtClean="0"/>
-              <a:t>11/12/2018</a:t>
+              <a:t>11/16/2018</a:t>
             </a:fld>
             <a:endParaRPr lang="en-US"/>
           </a:p>
@@ -1405,7 +1410,7 @@
           <a:p>
             <a:fld id="{7E5197F0-50BA-46ED-B704-23702634247F}" type="datetimeFigureOut">
               <a:rPr lang="en-US" smtClean="0"/>
-              <a:t>11/12/2018</a:t>
+              <a:t>11/16/2018</a:t>
             </a:fld>
             <a:endParaRPr lang="en-US"/>
           </a:p>
@@ -1817,7 +1822,7 @@
           <a:p>
             <a:fld id="{7E5197F0-50BA-46ED-B704-23702634247F}" type="datetimeFigureOut">
               <a:rPr lang="en-US" smtClean="0"/>
-              <a:t>11/12/2018</a:t>
+              <a:t>11/16/2018</a:t>
             </a:fld>
             <a:endParaRPr lang="en-US"/>
           </a:p>
@@ -1958,7 +1963,7 @@
           <a:p>
             <a:fld id="{7E5197F0-50BA-46ED-B704-23702634247F}" type="datetimeFigureOut">
               <a:rPr lang="en-US" smtClean="0"/>
-              <a:t>11/12/2018</a:t>
+              <a:t>11/16/2018</a:t>
             </a:fld>
             <a:endParaRPr lang="en-US"/>
           </a:p>
@@ -2071,7 +2076,7 @@
           <a:p>
             <a:fld id="{7E5197F0-50BA-46ED-B704-23702634247F}" type="datetimeFigureOut">
               <a:rPr lang="en-US" smtClean="0"/>
-              <a:t>11/12/2018</a:t>
+              <a:t>11/16/2018</a:t>
             </a:fld>
             <a:endParaRPr lang="en-US"/>
           </a:p>
@@ -2382,7 +2387,7 @@
           <a:p>
             <a:fld id="{7E5197F0-50BA-46ED-B704-23702634247F}" type="datetimeFigureOut">
               <a:rPr lang="en-US" smtClean="0"/>
-              <a:t>11/12/2018</a:t>
+              <a:t>11/16/2018</a:t>
             </a:fld>
             <a:endParaRPr lang="en-US"/>
           </a:p>
@@ -2670,7 +2675,7 @@
           <a:p>
             <a:fld id="{7E5197F0-50BA-46ED-B704-23702634247F}" type="datetimeFigureOut">
               <a:rPr lang="en-US" smtClean="0"/>
-              <a:t>11/12/2018</a:t>
+              <a:t>11/16/2018</a:t>
             </a:fld>
             <a:endParaRPr lang="en-US"/>
           </a:p>
@@ -2911,7 +2916,7 @@
           <a:p>
             <a:fld id="{7E5197F0-50BA-46ED-B704-23702634247F}" type="datetimeFigureOut">
               <a:rPr lang="en-US" smtClean="0"/>
-              <a:t>11/12/2018</a:t>
+              <a:t>11/16/2018</a:t>
             </a:fld>
             <a:endParaRPr lang="en-US"/>
           </a:p>
@@ -3759,7 +3764,14 @@
           <a:p>
             <a:r>
               <a:rPr lang="en-US" dirty="0"/>
-              <a:t>Navigate to </a:t>
+              <a:t>Click “Users” button on home page.</a:t>
+            </a:r>
+          </a:p>
+          <a:p>
+            <a:pPr lvl="1"/>
+            <a:r>
+              <a:rPr lang="en-US" dirty="0"/>
+              <a:t>Should navigate to </a:t>
             </a:r>
             <a:r>
               <a:rPr lang="en-US" dirty="0">
@@ -3783,14 +3795,21 @@
               <a:t>Each user should be clickable</a:t>
             </a:r>
           </a:p>
+          <a:p>
+            <a:pPr lvl="1"/>
+            <a:r>
+              <a:rPr lang="en-US" dirty="0"/>
+              <a:t>Odd-numbered entries should have a light-blue background.</a:t>
+            </a:r>
+          </a:p>
         </p:txBody>
       </p:sp>
       <p:pic>
         <p:nvPicPr>
-          <p:cNvPr id="5" name="Picture 4">
-            <a:extLst>
-              <a:ext uri="{FF2B5EF4-FFF2-40B4-BE49-F238E27FC236}">
-                <a16:creationId xmlns:a16="http://schemas.microsoft.com/office/drawing/2014/main" id="{4C0CC381-1BEF-46A5-92A1-4A2573F08B8B}"/>
+          <p:cNvPr id="7" name="Picture 6">
+            <a:extLst>
+              <a:ext uri="{FF2B5EF4-FFF2-40B4-BE49-F238E27FC236}">
+                <a16:creationId xmlns:a16="http://schemas.microsoft.com/office/drawing/2014/main" id="{CFF87B11-C8BF-445E-9933-0F7AB65287B3}"/>
               </a:ext>
             </a:extLst>
           </p:cNvPr>
@@ -3807,12 +3826,17 @@
         </p:blipFill>
         <p:spPr>
           <a:xfrm>
-            <a:off x="6161315" y="1544416"/>
-            <a:ext cx="5408645" cy="3769167"/>
+            <a:off x="6096000" y="3196651"/>
+            <a:ext cx="5690616" cy="1090819"/>
           </a:xfrm>
           <a:prstGeom prst="rect">
             <a:avLst/>
           </a:prstGeom>
+          <a:ln>
+            <a:solidFill>
+              <a:srgbClr val="FF0000"/>
+            </a:solidFill>
+          </a:ln>
         </p:spPr>
       </p:pic>
     </p:spTree>
@@ -3951,6 +3975,36 @@
           <a:xfrm>
             <a:off x="6548097" y="1694637"/>
             <a:ext cx="4977521" cy="3468726"/>
+          </a:xfrm>
+          <a:prstGeom prst="rect">
+            <a:avLst/>
+          </a:prstGeom>
+        </p:spPr>
+      </p:pic>
+      <p:pic>
+        <p:nvPicPr>
+          <p:cNvPr id="5" name="Picture 4">
+            <a:extLst>
+              <a:ext uri="{FF2B5EF4-FFF2-40B4-BE49-F238E27FC236}">
+                <a16:creationId xmlns:a16="http://schemas.microsoft.com/office/drawing/2014/main" id="{CB142C89-44F9-4568-A06F-D9385F329CBA}"/>
+              </a:ext>
+            </a:extLst>
+          </p:cNvPr>
+          <p:cNvPicPr>
+            <a:picLocks noChangeAspect="1"/>
+          </p:cNvPicPr>
+          <p:nvPr/>
+        </p:nvPicPr>
+        <p:blipFill>
+          <a:blip r:embed="rId4"/>
+          <a:stretch>
+            <a:fillRect/>
+          </a:stretch>
+        </p:blipFill>
+        <p:spPr>
+          <a:xfrm>
+            <a:off x="5665221" y="1605063"/>
+            <a:ext cx="4146379" cy="2224360"/>
           </a:xfrm>
           <a:prstGeom prst="rect">
             <a:avLst/>

</xml_diff>

<commit_message>
Add documentation to 'profile.css', 'users.css', and 'profile.html', update manual test plan for profile, users, and chat pages, and upload another clip art image of a fish for the manual test plan.
</commit_message>
<xml_diff>
--- a/Test Plan.pptx
+++ b/Test Plan.pptx
@@ -10,9 +10,13 @@
     <p:sldId id="258" r:id="rId4"/>
     <p:sldId id="259" r:id="rId5"/>
     <p:sldId id="260" r:id="rId6"/>
-    <p:sldId id="261" r:id="rId7"/>
-    <p:sldId id="262" r:id="rId8"/>
-    <p:sldId id="263" r:id="rId9"/>
+    <p:sldId id="264" r:id="rId7"/>
+    <p:sldId id="265" r:id="rId8"/>
+    <p:sldId id="266" r:id="rId9"/>
+    <p:sldId id="261" r:id="rId10"/>
+    <p:sldId id="267" r:id="rId11"/>
+    <p:sldId id="262" r:id="rId12"/>
+    <p:sldId id="263" r:id="rId13"/>
   </p:sldIdLst>
   <p:sldSz cx="12192000" cy="6858000"/>
   <p:notesSz cx="6858000" cy="9144000"/>
@@ -111,6 +115,11 @@
       </a:defRPr>
     </a:lvl9pPr>
   </p:defaultTextStyle>
+  <p:extLst>
+    <p:ext uri="{EFAFB233-063F-42B5-8137-9DF3F51BA10A}">
+      <p15:sldGuideLst xmlns:p15="http://schemas.microsoft.com/office/powerpoint/2012/main"/>
+    </p:ext>
+  </p:extLst>
 </p:presentation>
 </file>
 
@@ -261,7 +270,7 @@
           <a:p>
             <a:fld id="{7E5197F0-50BA-46ED-B704-23702634247F}" type="datetimeFigureOut">
               <a:rPr lang="en-US" smtClean="0"/>
-              <a:t>11/12/2018</a:t>
+              <a:t>11/16/2018</a:t>
             </a:fld>
             <a:endParaRPr lang="en-US"/>
           </a:p>
@@ -459,7 +468,7 @@
           <a:p>
             <a:fld id="{7E5197F0-50BA-46ED-B704-23702634247F}" type="datetimeFigureOut">
               <a:rPr lang="en-US" smtClean="0"/>
-              <a:t>11/12/2018</a:t>
+              <a:t>11/16/2018</a:t>
             </a:fld>
             <a:endParaRPr lang="en-US"/>
           </a:p>
@@ -667,7 +676,7 @@
           <a:p>
             <a:fld id="{7E5197F0-50BA-46ED-B704-23702634247F}" type="datetimeFigureOut">
               <a:rPr lang="en-US" smtClean="0"/>
-              <a:t>11/12/2018</a:t>
+              <a:t>11/16/2018</a:t>
             </a:fld>
             <a:endParaRPr lang="en-US"/>
           </a:p>
@@ -865,7 +874,7 @@
           <a:p>
             <a:fld id="{7E5197F0-50BA-46ED-B704-23702634247F}" type="datetimeFigureOut">
               <a:rPr lang="en-US" smtClean="0"/>
-              <a:t>11/12/2018</a:t>
+              <a:t>11/16/2018</a:t>
             </a:fld>
             <a:endParaRPr lang="en-US"/>
           </a:p>
@@ -1140,7 +1149,7 @@
           <a:p>
             <a:fld id="{7E5197F0-50BA-46ED-B704-23702634247F}" type="datetimeFigureOut">
               <a:rPr lang="en-US" smtClean="0"/>
-              <a:t>11/12/2018</a:t>
+              <a:t>11/16/2018</a:t>
             </a:fld>
             <a:endParaRPr lang="en-US"/>
           </a:p>
@@ -1405,7 +1414,7 @@
           <a:p>
             <a:fld id="{7E5197F0-50BA-46ED-B704-23702634247F}" type="datetimeFigureOut">
               <a:rPr lang="en-US" smtClean="0"/>
-              <a:t>11/12/2018</a:t>
+              <a:t>11/16/2018</a:t>
             </a:fld>
             <a:endParaRPr lang="en-US"/>
           </a:p>
@@ -1817,7 +1826,7 @@
           <a:p>
             <a:fld id="{7E5197F0-50BA-46ED-B704-23702634247F}" type="datetimeFigureOut">
               <a:rPr lang="en-US" smtClean="0"/>
-              <a:t>11/12/2018</a:t>
+              <a:t>11/16/2018</a:t>
             </a:fld>
             <a:endParaRPr lang="en-US"/>
           </a:p>
@@ -1958,7 +1967,7 @@
           <a:p>
             <a:fld id="{7E5197F0-50BA-46ED-B704-23702634247F}" type="datetimeFigureOut">
               <a:rPr lang="en-US" smtClean="0"/>
-              <a:t>11/12/2018</a:t>
+              <a:t>11/16/2018</a:t>
             </a:fld>
             <a:endParaRPr lang="en-US"/>
           </a:p>
@@ -2071,7 +2080,7 @@
           <a:p>
             <a:fld id="{7E5197F0-50BA-46ED-B704-23702634247F}" type="datetimeFigureOut">
               <a:rPr lang="en-US" smtClean="0"/>
-              <a:t>11/12/2018</a:t>
+              <a:t>11/16/2018</a:t>
             </a:fld>
             <a:endParaRPr lang="en-US"/>
           </a:p>
@@ -2382,7 +2391,7 @@
           <a:p>
             <a:fld id="{7E5197F0-50BA-46ED-B704-23702634247F}" type="datetimeFigureOut">
               <a:rPr lang="en-US" smtClean="0"/>
-              <a:t>11/12/2018</a:t>
+              <a:t>11/16/2018</a:t>
             </a:fld>
             <a:endParaRPr lang="en-US"/>
           </a:p>
@@ -2670,7 +2679,7 @@
           <a:p>
             <a:fld id="{7E5197F0-50BA-46ED-B704-23702634247F}" type="datetimeFigureOut">
               <a:rPr lang="en-US" smtClean="0"/>
-              <a:t>11/12/2018</a:t>
+              <a:t>11/16/2018</a:t>
             </a:fld>
             <a:endParaRPr lang="en-US"/>
           </a:p>
@@ -2911,7 +2920,7 @@
           <a:p>
             <a:fld id="{7E5197F0-50BA-46ED-B704-23702634247F}" type="datetimeFigureOut">
               <a:rPr lang="en-US" smtClean="0"/>
-              <a:t>11/12/2018</a:t>
+              <a:t>11/16/2018</a:t>
             </a:fld>
             <a:endParaRPr lang="en-US"/>
           </a:p>
@@ -3394,6 +3403,446 @@
 </p:sld>
 </file>
 
+<file path=ppt/slides/slide10.xml><?xml version="1.0" encoding="utf-8"?>
+<p:sld xmlns:a="http://schemas.openxmlformats.org/drawingml/2006/main" xmlns:r="http://schemas.openxmlformats.org/officeDocument/2006/relationships" xmlns:p="http://schemas.openxmlformats.org/presentationml/2006/main">
+  <p:cSld>
+    <p:spTree>
+      <p:nvGrpSpPr>
+        <p:cNvPr id="1" name=""/>
+        <p:cNvGrpSpPr/>
+        <p:nvPr/>
+      </p:nvGrpSpPr>
+      <p:grpSpPr>
+        <a:xfrm>
+          <a:off x="0" y="0"/>
+          <a:ext cx="0" cy="0"/>
+          <a:chOff x="0" y="0"/>
+          <a:chExt cx="0" cy="0"/>
+        </a:xfrm>
+      </p:grpSpPr>
+      <p:sp>
+        <p:nvSpPr>
+          <p:cNvPr id="2" name="Title 1">
+            <a:extLst>
+              <a:ext uri="{FF2B5EF4-FFF2-40B4-BE49-F238E27FC236}">
+                <a16:creationId xmlns:a16="http://schemas.microsoft.com/office/drawing/2014/main" id="{58D0B2D1-18F7-450F-BAB9-639133F126A0}"/>
+              </a:ext>
+            </a:extLst>
+          </p:cNvPr>
+          <p:cNvSpPr>
+            <a:spLocks noGrp="1"/>
+          </p:cNvSpPr>
+          <p:nvPr>
+            <p:ph type="title"/>
+          </p:nvPr>
+        </p:nvSpPr>
+        <p:spPr/>
+        <p:txBody>
+          <a:bodyPr/>
+          <a:lstStyle/>
+          <a:p>
+            <a:r>
+              <a:rPr lang="en-US" dirty="0"/>
+              <a:t>Chat Page Cont.</a:t>
+            </a:r>
+          </a:p>
+        </p:txBody>
+      </p:sp>
+      <p:sp>
+        <p:nvSpPr>
+          <p:cNvPr id="3" name="Content Placeholder 2">
+            <a:extLst>
+              <a:ext uri="{FF2B5EF4-FFF2-40B4-BE49-F238E27FC236}">
+                <a16:creationId xmlns:a16="http://schemas.microsoft.com/office/drawing/2014/main" id="{5AACEC3F-24D1-456D-A268-CBFB921AF972}"/>
+              </a:ext>
+            </a:extLst>
+          </p:cNvPr>
+          <p:cNvSpPr>
+            <a:spLocks noGrp="1"/>
+          </p:cNvSpPr>
+          <p:nvPr>
+            <p:ph idx="1"/>
+          </p:nvPr>
+        </p:nvSpPr>
+        <p:spPr>
+          <a:xfrm>
+            <a:off x="838200" y="1825625"/>
+            <a:ext cx="4287473" cy="4351338"/>
+          </a:xfrm>
+        </p:spPr>
+        <p:txBody>
+          <a:bodyPr>
+            <a:normAutofit lnSpcReduction="10000"/>
+          </a:bodyPr>
+          <a:lstStyle/>
+          <a:p>
+            <a:r>
+              <a:rPr lang="en-US" dirty="0"/>
+              <a:t>Open chat page in two browser tabs.</a:t>
+            </a:r>
+          </a:p>
+          <a:p>
+            <a:pPr lvl="1"/>
+            <a:r>
+              <a:rPr lang="en-US" dirty="0"/>
+              <a:t>Type username and messages into either tab and hit ‘Enter’.</a:t>
+            </a:r>
+          </a:p>
+          <a:p>
+            <a:pPr lvl="1"/>
+            <a:r>
+              <a:rPr lang="en-US" dirty="0"/>
+              <a:t>Messages should show on both tabs.</a:t>
+            </a:r>
+          </a:p>
+          <a:p>
+            <a:pPr lvl="1"/>
+            <a:r>
+              <a:rPr lang="en-US" dirty="0"/>
+              <a:t>Every sent message should be of the form “&lt;username&gt;: &lt;message&gt;”.</a:t>
+            </a:r>
+          </a:p>
+          <a:p>
+            <a:pPr lvl="1"/>
+            <a:r>
+              <a:rPr lang="en-US" dirty="0"/>
+              <a:t>Every odd-numbered message should have a gray background.</a:t>
+            </a:r>
+          </a:p>
+        </p:txBody>
+      </p:sp>
+      <p:pic>
+        <p:nvPicPr>
+          <p:cNvPr id="10" name="Picture 9">
+            <a:extLst>
+              <a:ext uri="{FF2B5EF4-FFF2-40B4-BE49-F238E27FC236}">
+                <a16:creationId xmlns:a16="http://schemas.microsoft.com/office/drawing/2014/main" id="{B6A16A47-18D5-487C-8C03-E201291CE532}"/>
+              </a:ext>
+            </a:extLst>
+          </p:cNvPr>
+          <p:cNvPicPr>
+            <a:picLocks noChangeAspect="1"/>
+          </p:cNvPicPr>
+          <p:nvPr/>
+        </p:nvPicPr>
+        <p:blipFill>
+          <a:blip r:embed="rId2"/>
+          <a:stretch>
+            <a:fillRect/>
+          </a:stretch>
+        </p:blipFill>
+        <p:spPr>
+          <a:xfrm>
+            <a:off x="6497515" y="365125"/>
+            <a:ext cx="5227558" cy="2809813"/>
+          </a:xfrm>
+          <a:prstGeom prst="rect">
+            <a:avLst/>
+          </a:prstGeom>
+          <a:ln>
+            <a:solidFill>
+              <a:srgbClr val="FF0000"/>
+            </a:solidFill>
+          </a:ln>
+        </p:spPr>
+      </p:pic>
+    </p:spTree>
+    <p:extLst>
+      <p:ext uri="{BB962C8B-B14F-4D97-AF65-F5344CB8AC3E}">
+        <p14:creationId xmlns:p14="http://schemas.microsoft.com/office/powerpoint/2010/main" val="4204902031"/>
+      </p:ext>
+    </p:extLst>
+  </p:cSld>
+  <p:clrMapOvr>
+    <a:masterClrMapping/>
+  </p:clrMapOvr>
+</p:sld>
+</file>
+
+<file path=ppt/slides/slide11.xml><?xml version="1.0" encoding="utf-8"?>
+<p:sld xmlns:a="http://schemas.openxmlformats.org/drawingml/2006/main" xmlns:r="http://schemas.openxmlformats.org/officeDocument/2006/relationships" xmlns:p="http://schemas.openxmlformats.org/presentationml/2006/main">
+  <p:cSld>
+    <p:spTree>
+      <p:nvGrpSpPr>
+        <p:cNvPr id="1" name=""/>
+        <p:cNvGrpSpPr/>
+        <p:nvPr/>
+      </p:nvGrpSpPr>
+      <p:grpSpPr>
+        <a:xfrm>
+          <a:off x="0" y="0"/>
+          <a:ext cx="0" cy="0"/>
+          <a:chOff x="0" y="0"/>
+          <a:chExt cx="0" cy="0"/>
+        </a:xfrm>
+      </p:grpSpPr>
+      <p:sp>
+        <p:nvSpPr>
+          <p:cNvPr id="2" name="Title 1">
+            <a:extLst>
+              <a:ext uri="{FF2B5EF4-FFF2-40B4-BE49-F238E27FC236}">
+                <a16:creationId xmlns:a16="http://schemas.microsoft.com/office/drawing/2014/main" id="{9CB58394-2779-4D9C-AFB7-0A8FC6E82FA2}"/>
+              </a:ext>
+            </a:extLst>
+          </p:cNvPr>
+          <p:cNvSpPr>
+            <a:spLocks noGrp="1"/>
+          </p:cNvSpPr>
+          <p:nvPr>
+            <p:ph type="title"/>
+          </p:nvPr>
+        </p:nvSpPr>
+        <p:spPr/>
+        <p:txBody>
+          <a:bodyPr/>
+          <a:lstStyle/>
+          <a:p>
+            <a:r>
+              <a:rPr lang="en-US" dirty="0"/>
+              <a:t>Audio Page</a:t>
+            </a:r>
+          </a:p>
+        </p:txBody>
+      </p:sp>
+      <p:sp>
+        <p:nvSpPr>
+          <p:cNvPr id="3" name="Content Placeholder 2">
+            <a:extLst>
+              <a:ext uri="{FF2B5EF4-FFF2-40B4-BE49-F238E27FC236}">
+                <a16:creationId xmlns:a16="http://schemas.microsoft.com/office/drawing/2014/main" id="{5783205A-A926-4B9E-B92F-63FF96D003F5}"/>
+              </a:ext>
+            </a:extLst>
+          </p:cNvPr>
+          <p:cNvSpPr>
+            <a:spLocks noGrp="1"/>
+          </p:cNvSpPr>
+          <p:nvPr>
+            <p:ph idx="1"/>
+          </p:nvPr>
+        </p:nvSpPr>
+        <p:spPr>
+          <a:xfrm>
+            <a:off x="838200" y="1825625"/>
+            <a:ext cx="5892264" cy="4351338"/>
+          </a:xfrm>
+        </p:spPr>
+        <p:txBody>
+          <a:bodyPr/>
+          <a:lstStyle/>
+          <a:p>
+            <a:r>
+              <a:rPr lang="en-US" dirty="0"/>
+              <a:t>Navigate to </a:t>
+            </a:r>
+            <a:r>
+              <a:rPr lang="en-US" dirty="0">
+                <a:hlinkClick r:id="rId2"/>
+              </a:rPr>
+              <a:t>http://localhost:3000/html/audio.html</a:t>
+            </a:r>
+            <a:endParaRPr lang="en-US" dirty="0"/>
+          </a:p>
+          <a:p>
+            <a:pPr lvl="1"/>
+            <a:r>
+              <a:rPr lang="en-US" dirty="0"/>
+              <a:t>Should see title and buttons centered in screen</a:t>
+            </a:r>
+          </a:p>
+          <a:p>
+            <a:pPr lvl="1"/>
+            <a:r>
+              <a:rPr lang="en-US" dirty="0"/>
+              <a:t>A message should appear telling you that the audio files have been loaded</a:t>
+            </a:r>
+          </a:p>
+        </p:txBody>
+      </p:sp>
+      <p:pic>
+        <p:nvPicPr>
+          <p:cNvPr id="4" name="Picture 3">
+            <a:extLst>
+              <a:ext uri="{FF2B5EF4-FFF2-40B4-BE49-F238E27FC236}">
+                <a16:creationId xmlns:a16="http://schemas.microsoft.com/office/drawing/2014/main" id="{891010E6-3CEE-4026-8896-A26FA2652A75}"/>
+              </a:ext>
+            </a:extLst>
+          </p:cNvPr>
+          <p:cNvPicPr>
+            <a:picLocks noChangeAspect="1"/>
+          </p:cNvPicPr>
+          <p:nvPr/>
+        </p:nvPicPr>
+        <p:blipFill>
+          <a:blip r:embed="rId3"/>
+          <a:stretch>
+            <a:fillRect/>
+          </a:stretch>
+        </p:blipFill>
+        <p:spPr>
+          <a:xfrm>
+            <a:off x="7100597" y="1132910"/>
+            <a:ext cx="3883070" cy="4832886"/>
+          </a:xfrm>
+          <a:prstGeom prst="rect">
+            <a:avLst/>
+          </a:prstGeom>
+        </p:spPr>
+      </p:pic>
+    </p:spTree>
+    <p:extLst>
+      <p:ext uri="{BB962C8B-B14F-4D97-AF65-F5344CB8AC3E}">
+        <p14:creationId xmlns:p14="http://schemas.microsoft.com/office/powerpoint/2010/main" val="3120464656"/>
+      </p:ext>
+    </p:extLst>
+  </p:cSld>
+  <p:clrMapOvr>
+    <a:masterClrMapping/>
+  </p:clrMapOvr>
+</p:sld>
+</file>
+
+<file path=ppt/slides/slide12.xml><?xml version="1.0" encoding="utf-8"?>
+<p:sld xmlns:a="http://schemas.openxmlformats.org/drawingml/2006/main" xmlns:r="http://schemas.openxmlformats.org/officeDocument/2006/relationships" xmlns:p="http://schemas.openxmlformats.org/presentationml/2006/main">
+  <p:cSld>
+    <p:spTree>
+      <p:nvGrpSpPr>
+        <p:cNvPr id="1" name=""/>
+        <p:cNvGrpSpPr/>
+        <p:nvPr/>
+      </p:nvGrpSpPr>
+      <p:grpSpPr>
+        <a:xfrm>
+          <a:off x="0" y="0"/>
+          <a:ext cx="0" cy="0"/>
+          <a:chOff x="0" y="0"/>
+          <a:chExt cx="0" cy="0"/>
+        </a:xfrm>
+      </p:grpSpPr>
+      <p:sp>
+        <p:nvSpPr>
+          <p:cNvPr id="2" name="Title 1">
+            <a:extLst>
+              <a:ext uri="{FF2B5EF4-FFF2-40B4-BE49-F238E27FC236}">
+                <a16:creationId xmlns:a16="http://schemas.microsoft.com/office/drawing/2014/main" id="{6385F505-6C66-43DD-A624-E0218062F6B7}"/>
+              </a:ext>
+            </a:extLst>
+          </p:cNvPr>
+          <p:cNvSpPr>
+            <a:spLocks noGrp="1"/>
+          </p:cNvSpPr>
+          <p:nvPr>
+            <p:ph type="title"/>
+          </p:nvPr>
+        </p:nvSpPr>
+        <p:spPr/>
+        <p:txBody>
+          <a:bodyPr/>
+          <a:lstStyle/>
+          <a:p>
+            <a:r>
+              <a:rPr lang="en-US" dirty="0"/>
+              <a:t>Audio Page</a:t>
+            </a:r>
+          </a:p>
+        </p:txBody>
+      </p:sp>
+      <p:sp>
+        <p:nvSpPr>
+          <p:cNvPr id="3" name="Content Placeholder 2">
+            <a:extLst>
+              <a:ext uri="{FF2B5EF4-FFF2-40B4-BE49-F238E27FC236}">
+                <a16:creationId xmlns:a16="http://schemas.microsoft.com/office/drawing/2014/main" id="{EB5B5BBD-ED9A-426B-8A46-E4A2CF0B267D}"/>
+              </a:ext>
+            </a:extLst>
+          </p:cNvPr>
+          <p:cNvSpPr>
+            <a:spLocks noGrp="1"/>
+          </p:cNvSpPr>
+          <p:nvPr>
+            <p:ph idx="1"/>
+          </p:nvPr>
+        </p:nvSpPr>
+        <p:spPr>
+          <a:xfrm>
+            <a:off x="838200" y="1825625"/>
+            <a:ext cx="4582886" cy="4351338"/>
+          </a:xfrm>
+        </p:spPr>
+        <p:txBody>
+          <a:bodyPr/>
+          <a:lstStyle/>
+          <a:p>
+            <a:r>
+              <a:rPr lang="en-US" dirty="0"/>
+              <a:t>Continued</a:t>
+            </a:r>
+          </a:p>
+          <a:p>
+            <a:pPr lvl="1"/>
+            <a:r>
+              <a:rPr lang="en-US" dirty="0"/>
+              <a:t>Pressing a button on either tab will play an audio file</a:t>
+            </a:r>
+          </a:p>
+          <a:p>
+            <a:pPr lvl="1"/>
+            <a:r>
+              <a:rPr lang="en-US" dirty="0"/>
+              <a:t>Audio files should be played on both tabs</a:t>
+            </a:r>
+          </a:p>
+          <a:p>
+            <a:pPr lvl="1"/>
+            <a:r>
+              <a:rPr lang="en-US" dirty="0"/>
+              <a:t>Sound should be in sync no matter how irregular clicks are made</a:t>
+            </a:r>
+          </a:p>
+        </p:txBody>
+      </p:sp>
+      <p:pic>
+        <p:nvPicPr>
+          <p:cNvPr id="4" name="Picture 3">
+            <a:extLst>
+              <a:ext uri="{FF2B5EF4-FFF2-40B4-BE49-F238E27FC236}">
+                <a16:creationId xmlns:a16="http://schemas.microsoft.com/office/drawing/2014/main" id="{1C252AD4-2BA1-4D85-BA3F-E008D50DFBDE}"/>
+              </a:ext>
+            </a:extLst>
+          </p:cNvPr>
+          <p:cNvPicPr>
+            <a:picLocks noChangeAspect="1"/>
+          </p:cNvPicPr>
+          <p:nvPr/>
+        </p:nvPicPr>
+        <p:blipFill>
+          <a:blip r:embed="rId2"/>
+          <a:stretch>
+            <a:fillRect/>
+          </a:stretch>
+        </p:blipFill>
+        <p:spPr>
+          <a:xfrm>
+            <a:off x="5607698" y="1690688"/>
+            <a:ext cx="6234180" cy="3820234"/>
+          </a:xfrm>
+          <a:prstGeom prst="rect">
+            <a:avLst/>
+          </a:prstGeom>
+        </p:spPr>
+      </p:pic>
+    </p:spTree>
+    <p:extLst>
+      <p:ext uri="{BB962C8B-B14F-4D97-AF65-F5344CB8AC3E}">
+        <p14:creationId xmlns:p14="http://schemas.microsoft.com/office/powerpoint/2010/main" val="849073764"/>
+      </p:ext>
+    </p:extLst>
+  </p:cSld>
+  <p:clrMapOvr>
+    <a:masterClrMapping/>
+  </p:clrMapOvr>
+</p:sld>
+</file>
+
 <file path=ppt/slides/slide2.xml><?xml version="1.0" encoding="utf-8"?>
 <p:sld xmlns:a="http://schemas.openxmlformats.org/drawingml/2006/main" xmlns:r="http://schemas.openxmlformats.org/officeDocument/2006/relationships" xmlns:p="http://schemas.openxmlformats.org/presentationml/2006/main">
   <p:cSld>
@@ -3577,7 +4026,7 @@
           <a:p>
             <a:r>
               <a:rPr lang="en-US" dirty="0"/>
-              <a:t>Home page</a:t>
+              <a:t>Home Page</a:t>
             </a:r>
           </a:p>
         </p:txBody>
@@ -3726,7 +4175,7 @@
           <a:p>
             <a:r>
               <a:rPr lang="en-US" dirty="0"/>
-              <a:t>Users page</a:t>
+              <a:t>Users Page</a:t>
             </a:r>
           </a:p>
         </p:txBody>
@@ -3759,7 +4208,14 @@
           <a:p>
             <a:r>
               <a:rPr lang="en-US" dirty="0"/>
-              <a:t>Navigate to </a:t>
+              <a:t>Click “Users” button on home page.</a:t>
+            </a:r>
+          </a:p>
+          <a:p>
+            <a:pPr lvl="1"/>
+            <a:r>
+              <a:rPr lang="en-US" dirty="0"/>
+              <a:t>Should navigate to </a:t>
             </a:r>
             <a:r>
               <a:rPr lang="en-US" dirty="0">
@@ -3783,14 +4239,21 @@
               <a:t>Each user should be clickable</a:t>
             </a:r>
           </a:p>
+          <a:p>
+            <a:pPr lvl="1"/>
+            <a:r>
+              <a:rPr lang="en-US" dirty="0"/>
+              <a:t>Odd-numbered entries should have a light-blue background.</a:t>
+            </a:r>
+          </a:p>
         </p:txBody>
       </p:sp>
       <p:pic>
         <p:nvPicPr>
-          <p:cNvPr id="5" name="Picture 4">
-            <a:extLst>
-              <a:ext uri="{FF2B5EF4-FFF2-40B4-BE49-F238E27FC236}">
-                <a16:creationId xmlns:a16="http://schemas.microsoft.com/office/drawing/2014/main" id="{4C0CC381-1BEF-46A5-92A1-4A2573F08B8B}"/>
+          <p:cNvPr id="7" name="Picture 6">
+            <a:extLst>
+              <a:ext uri="{FF2B5EF4-FFF2-40B4-BE49-F238E27FC236}">
+                <a16:creationId xmlns:a16="http://schemas.microsoft.com/office/drawing/2014/main" id="{CFF87B11-C8BF-445E-9933-0F7AB65287B3}"/>
               </a:ext>
             </a:extLst>
           </p:cNvPr>
@@ -3807,12 +4270,17 @@
         </p:blipFill>
         <p:spPr>
           <a:xfrm>
-            <a:off x="6161315" y="1544416"/>
-            <a:ext cx="5408645" cy="3769167"/>
+            <a:off x="6096000" y="3196651"/>
+            <a:ext cx="5690616" cy="1090819"/>
           </a:xfrm>
           <a:prstGeom prst="rect">
             <a:avLst/>
           </a:prstGeom>
+          <a:ln>
+            <a:solidFill>
+              <a:srgbClr val="FF0000"/>
+            </a:solidFill>
+          </a:ln>
         </p:spPr>
       </p:pic>
     </p:spTree>
@@ -3868,7 +4336,7 @@
           <a:p>
             <a:r>
               <a:rPr lang="en-US" dirty="0"/>
-              <a:t>Profile page</a:t>
+              <a:t>Profile Page</a:t>
             </a:r>
           </a:p>
         </p:txBody>
@@ -3901,7 +4369,14 @@
           <a:p>
             <a:r>
               <a:rPr lang="en-US" dirty="0"/>
-              <a:t>Navigate to </a:t>
+              <a:t>Click “Tommy” entry on “Users” page.</a:t>
+            </a:r>
+          </a:p>
+          <a:p>
+            <a:pPr lvl="1"/>
+            <a:r>
+              <a:rPr lang="en-US" dirty="0"/>
+              <a:t>Should navigate to </a:t>
             </a:r>
             <a:r>
               <a:rPr lang="en-US" dirty="0">
@@ -3915,24 +4390,37 @@
             <a:pPr lvl="1"/>
             <a:r>
               <a:rPr lang="en-US" dirty="0"/>
-              <a:t>Should see profile page with tabs</a:t>
+              <a:t>Should see profile page with “Profile”, “Followers”, and “Settings” tabs</a:t>
             </a:r>
           </a:p>
           <a:p>
             <a:pPr lvl="1"/>
             <a:r>
               <a:rPr lang="en-US" dirty="0"/>
-              <a:t>Tabs are clickable</a:t>
-            </a:r>
+              <a:t>Tabs should be clickable</a:t>
+            </a:r>
+          </a:p>
+          <a:p>
+            <a:pPr lvl="1"/>
+            <a:r>
+              <a:rPr lang="en-US" dirty="0"/>
+              <a:t>Profile page should adjust layout depending on screen orientation.</a:t>
+            </a:r>
+          </a:p>
+          <a:p>
+            <a:pPr marL="457200" lvl="1" indent="0">
+              <a:buNone/>
+            </a:pPr>
+            <a:endParaRPr lang="en-US" dirty="0"/>
           </a:p>
         </p:txBody>
       </p:sp>
       <p:pic>
         <p:nvPicPr>
-          <p:cNvPr id="4" name="Picture 3">
-            <a:extLst>
-              <a:ext uri="{FF2B5EF4-FFF2-40B4-BE49-F238E27FC236}">
-                <a16:creationId xmlns:a16="http://schemas.microsoft.com/office/drawing/2014/main" id="{5D113938-6F1C-4B73-9962-50CCF4BBFECF}"/>
+          <p:cNvPr id="6" name="Picture 5">
+            <a:extLst>
+              <a:ext uri="{FF2B5EF4-FFF2-40B4-BE49-F238E27FC236}">
+                <a16:creationId xmlns:a16="http://schemas.microsoft.com/office/drawing/2014/main" id="{E9C63B88-85CA-47DC-ABEB-DDD36928141F}"/>
               </a:ext>
             </a:extLst>
           </p:cNvPr>
@@ -3949,14 +4437,124 @@
         </p:blipFill>
         <p:spPr>
           <a:xfrm>
-            <a:off x="6548097" y="1694637"/>
-            <a:ext cx="4977521" cy="3468726"/>
+            <a:off x="5977645" y="3748157"/>
+            <a:ext cx="4092478" cy="2195444"/>
           </a:xfrm>
           <a:prstGeom prst="rect">
             <a:avLst/>
           </a:prstGeom>
+          <a:ln>
+            <a:solidFill>
+              <a:srgbClr val="FF0000"/>
+            </a:solidFill>
+          </a:ln>
         </p:spPr>
       </p:pic>
+      <p:pic>
+        <p:nvPicPr>
+          <p:cNvPr id="7" name="Picture 6">
+            <a:extLst>
+              <a:ext uri="{FF2B5EF4-FFF2-40B4-BE49-F238E27FC236}">
+                <a16:creationId xmlns:a16="http://schemas.microsoft.com/office/drawing/2014/main" id="{D5836107-F751-4FF5-A805-2D38A7BAA00D}"/>
+              </a:ext>
+            </a:extLst>
+          </p:cNvPr>
+          <p:cNvPicPr>
+            <a:picLocks noChangeAspect="1"/>
+          </p:cNvPicPr>
+          <p:nvPr/>
+        </p:nvPicPr>
+        <p:blipFill>
+          <a:blip r:embed="rId4"/>
+          <a:stretch>
+            <a:fillRect/>
+          </a:stretch>
+        </p:blipFill>
+        <p:spPr>
+          <a:xfrm>
+            <a:off x="8520376" y="305611"/>
+            <a:ext cx="2833424" cy="3040028"/>
+          </a:xfrm>
+          <a:prstGeom prst="rect">
+            <a:avLst/>
+          </a:prstGeom>
+          <a:ln>
+            <a:solidFill>
+              <a:srgbClr val="FF0000"/>
+            </a:solidFill>
+          </a:ln>
+        </p:spPr>
+      </p:pic>
+      <p:sp>
+        <p:nvSpPr>
+          <p:cNvPr id="8" name="TextBox 7">
+            <a:extLst>
+              <a:ext uri="{FF2B5EF4-FFF2-40B4-BE49-F238E27FC236}">
+                <a16:creationId xmlns:a16="http://schemas.microsoft.com/office/drawing/2014/main" id="{46B0B86E-7D87-414E-9FE4-3EB1FA791CB8}"/>
+              </a:ext>
+            </a:extLst>
+          </p:cNvPr>
+          <p:cNvSpPr txBox="1"/>
+          <p:nvPr/>
+        </p:nvSpPr>
+        <p:spPr>
+          <a:xfrm>
+            <a:off x="10275278" y="5122852"/>
+            <a:ext cx="1629508" cy="954107"/>
+          </a:xfrm>
+          <a:prstGeom prst="rect">
+            <a:avLst/>
+          </a:prstGeom>
+          <a:noFill/>
+        </p:spPr>
+        <p:txBody>
+          <a:bodyPr wrap="square" rtlCol="0">
+            <a:spAutoFit/>
+          </a:bodyPr>
+          <a:lstStyle/>
+          <a:p>
+            <a:r>
+              <a:rPr lang="en-US" sz="2800" dirty="0"/>
+              <a:t>Full-Sized Window</a:t>
+            </a:r>
+          </a:p>
+        </p:txBody>
+      </p:sp>
+      <p:sp>
+        <p:nvSpPr>
+          <p:cNvPr id="9" name="TextBox 8">
+            <a:extLst>
+              <a:ext uri="{FF2B5EF4-FFF2-40B4-BE49-F238E27FC236}">
+                <a16:creationId xmlns:a16="http://schemas.microsoft.com/office/drawing/2014/main" id="{1108944A-785D-409A-A40A-214DFC9543BF}"/>
+              </a:ext>
+            </a:extLst>
+          </p:cNvPr>
+          <p:cNvSpPr txBox="1"/>
+          <p:nvPr/>
+        </p:nvSpPr>
+        <p:spPr>
+          <a:xfrm>
+            <a:off x="6603024" y="736581"/>
+            <a:ext cx="1629508" cy="954107"/>
+          </a:xfrm>
+          <a:prstGeom prst="rect">
+            <a:avLst/>
+          </a:prstGeom>
+          <a:noFill/>
+        </p:spPr>
+        <p:txBody>
+          <a:bodyPr wrap="square" rtlCol="0">
+            <a:spAutoFit/>
+          </a:bodyPr>
+          <a:lstStyle/>
+          <a:p>
+            <a:r>
+              <a:rPr lang="en-US" sz="2800" dirty="0"/>
+              <a:t>Vertical Window</a:t>
+            </a:r>
+          </a:p>
+        </p:txBody>
+      </p:sp>
     </p:spTree>
     <p:extLst>
       <p:ext uri="{BB962C8B-B14F-4D97-AF65-F5344CB8AC3E}">
@@ -3992,7 +4590,7 @@
           <p:cNvPr id="2" name="Title 1">
             <a:extLst>
               <a:ext uri="{FF2B5EF4-FFF2-40B4-BE49-F238E27FC236}">
-                <a16:creationId xmlns:a16="http://schemas.microsoft.com/office/drawing/2014/main" id="{58D0B2D1-18F7-450F-BAB9-639133F126A0}"/>
+                <a16:creationId xmlns:a16="http://schemas.microsoft.com/office/drawing/2014/main" id="{AE49AE2E-86DB-452D-A0BD-07975F40475E}"/>
               </a:ext>
             </a:extLst>
           </p:cNvPr>
@@ -4010,7 +4608,7 @@
           <a:p>
             <a:r>
               <a:rPr lang="en-US" dirty="0"/>
-              <a:t>Chat page</a:t>
+              <a:t>Settings Tab</a:t>
             </a:r>
           </a:p>
         </p:txBody>
@@ -4020,7 +4618,7 @@
           <p:cNvPr id="3" name="Content Placeholder 2">
             <a:extLst>
               <a:ext uri="{FF2B5EF4-FFF2-40B4-BE49-F238E27FC236}">
-                <a16:creationId xmlns:a16="http://schemas.microsoft.com/office/drawing/2014/main" id="{5AACEC3F-24D1-456D-A268-CBFB921AF972}"/>
+                <a16:creationId xmlns:a16="http://schemas.microsoft.com/office/drawing/2014/main" id="{2153A5CE-75CF-4CD3-ABC1-3FC5B2923528}"/>
               </a:ext>
             </a:extLst>
           </p:cNvPr>
@@ -4034,7 +4632,7 @@
         <p:spPr>
           <a:xfrm>
             <a:off x="838200" y="1825625"/>
-            <a:ext cx="4287473" cy="4351338"/>
+            <a:ext cx="5344486" cy="4351338"/>
           </a:xfrm>
         </p:spPr>
         <p:txBody>
@@ -4043,35 +4641,114 @@
           <a:p>
             <a:r>
               <a:rPr lang="en-US" dirty="0"/>
-              <a:t>Navigate to </a:t>
-            </a:r>
-            <a:r>
-              <a:rPr lang="en-US" dirty="0">
-                <a:hlinkClick r:id="rId2"/>
-              </a:rPr>
-              <a:t>http://localhost:3000/html/chat.html</a:t>
-            </a:r>
-            <a:endParaRPr lang="en-US" dirty="0"/>
+              <a:t>Click “Settings” tab on “Profile” page.</a:t>
+            </a:r>
           </a:p>
           <a:p>
             <a:pPr lvl="1"/>
             <a:r>
               <a:rPr lang="en-US" dirty="0"/>
-              <a:t>Open two browser tabs</a:t>
+              <a:t>Should see dropdown menu with label “Select Profile Image”</a:t>
             </a:r>
           </a:p>
           <a:p>
             <a:pPr lvl="1"/>
             <a:r>
               <a:rPr lang="en-US" dirty="0"/>
-              <a:t>Type messages into either tab and hit ‘Enter’</a:t>
+              <a:t>Dropdown menu should have “</a:t>
+            </a:r>
+            <a:r>
+              <a:rPr lang="en-US" dirty="0" err="1"/>
+              <a:t>JamATuna</a:t>
+            </a:r>
+            <a:r>
+              <a:rPr lang="en-US" dirty="0"/>
+              <a:t>” selected by default.</a:t>
             </a:r>
           </a:p>
           <a:p>
             <a:pPr lvl="1"/>
             <a:r>
               <a:rPr lang="en-US" dirty="0"/>
-              <a:t>Messages should show on both tabs</a:t>
+              <a:t>Dropdown menu should have “Orange Fish”, “Blue Fish”, “Clown Fish”, “Tuna”, “</a:t>
+            </a:r>
+            <a:r>
+              <a:rPr lang="en-US" dirty="0" err="1"/>
+              <a:t>JamATuna</a:t>
+            </a:r>
+            <a:r>
+              <a:rPr lang="en-US" dirty="0"/>
+              <a:t>”, and “Other” options.</a:t>
+            </a:r>
+          </a:p>
+        </p:txBody>
+      </p:sp>
+      <p:sp>
+        <p:nvSpPr>
+          <p:cNvPr id="8" name="TextBox 7">
+            <a:extLst>
+              <a:ext uri="{FF2B5EF4-FFF2-40B4-BE49-F238E27FC236}">
+                <a16:creationId xmlns:a16="http://schemas.microsoft.com/office/drawing/2014/main" id="{46B0B86E-7D87-414E-9FE4-3EB1FA791CB8}"/>
+              </a:ext>
+            </a:extLst>
+          </p:cNvPr>
+          <p:cNvSpPr txBox="1"/>
+          <p:nvPr/>
+        </p:nvSpPr>
+        <p:spPr>
+          <a:xfrm>
+            <a:off x="9546875" y="5538768"/>
+            <a:ext cx="1806925" cy="954107"/>
+          </a:xfrm>
+          <a:prstGeom prst="rect">
+            <a:avLst/>
+          </a:prstGeom>
+          <a:noFill/>
+        </p:spPr>
+        <p:txBody>
+          <a:bodyPr wrap="square" rtlCol="0">
+            <a:spAutoFit/>
+          </a:bodyPr>
+          <a:lstStyle/>
+          <a:p>
+            <a:r>
+              <a:rPr lang="en-US" sz="2800" dirty="0"/>
+              <a:t>Dropdown Menu</a:t>
+            </a:r>
+          </a:p>
+        </p:txBody>
+      </p:sp>
+      <p:sp>
+        <p:nvSpPr>
+          <p:cNvPr id="9" name="TextBox 8">
+            <a:extLst>
+              <a:ext uri="{FF2B5EF4-FFF2-40B4-BE49-F238E27FC236}">
+                <a16:creationId xmlns:a16="http://schemas.microsoft.com/office/drawing/2014/main" id="{1108944A-785D-409A-A40A-214DFC9543BF}"/>
+              </a:ext>
+            </a:extLst>
+          </p:cNvPr>
+          <p:cNvSpPr txBox="1"/>
+          <p:nvPr/>
+        </p:nvSpPr>
+        <p:spPr>
+          <a:xfrm>
+            <a:off x="5838093" y="736581"/>
+            <a:ext cx="1629508" cy="954107"/>
+          </a:xfrm>
+          <a:prstGeom prst="rect">
+            <a:avLst/>
+          </a:prstGeom>
+          <a:noFill/>
+        </p:spPr>
+        <p:txBody>
+          <a:bodyPr wrap="square" rtlCol="0">
+            <a:spAutoFit/>
+          </a:bodyPr>
+          <a:lstStyle/>
+          <a:p>
+            <a:r>
+              <a:rPr lang="en-US" sz="2800" dirty="0"/>
+              <a:t>Settings Tab</a:t>
             </a:r>
           </a:p>
         </p:txBody>
@@ -4081,7 +4758,42 @@
           <p:cNvPr id="4" name="Picture 3">
             <a:extLst>
               <a:ext uri="{FF2B5EF4-FFF2-40B4-BE49-F238E27FC236}">
-                <a16:creationId xmlns:a16="http://schemas.microsoft.com/office/drawing/2014/main" id="{AA7CA8AD-69A7-4F64-8F21-637584E466B5}"/>
+                <a16:creationId xmlns:a16="http://schemas.microsoft.com/office/drawing/2014/main" id="{1702C66C-0335-470A-912B-8251EB6BC5AA}"/>
+              </a:ext>
+            </a:extLst>
+          </p:cNvPr>
+          <p:cNvPicPr>
+            <a:picLocks noChangeAspect="1"/>
+          </p:cNvPicPr>
+          <p:nvPr/>
+        </p:nvPicPr>
+        <p:blipFill>
+          <a:blip r:embed="rId2"/>
+          <a:stretch>
+            <a:fillRect/>
+          </a:stretch>
+        </p:blipFill>
+        <p:spPr>
+          <a:xfrm>
+            <a:off x="7536516" y="736580"/>
+            <a:ext cx="3953557" cy="2120919"/>
+          </a:xfrm>
+          <a:prstGeom prst="rect">
+            <a:avLst/>
+          </a:prstGeom>
+          <a:ln>
+            <a:solidFill>
+              <a:srgbClr val="FF0000"/>
+            </a:solidFill>
+          </a:ln>
+        </p:spPr>
+      </p:pic>
+      <p:pic>
+        <p:nvPicPr>
+          <p:cNvPr id="10" name="Picture 9">
+            <a:extLst>
+              <a:ext uri="{FF2B5EF4-FFF2-40B4-BE49-F238E27FC236}">
+                <a16:creationId xmlns:a16="http://schemas.microsoft.com/office/drawing/2014/main" id="{7CD391A5-A470-4E02-9BBE-E130C642CBEE}"/>
               </a:ext>
             </a:extLst>
           </p:cNvPr>
@@ -4098,18 +4810,23 @@
         </p:blipFill>
         <p:spPr>
           <a:xfrm>
-            <a:off x="5287347" y="1690688"/>
-            <a:ext cx="6501287" cy="3981677"/>
+            <a:off x="7571267" y="3429000"/>
+            <a:ext cx="3918806" cy="1827585"/>
           </a:xfrm>
           <a:prstGeom prst="rect">
             <a:avLst/>
           </a:prstGeom>
+          <a:ln>
+            <a:solidFill>
+              <a:srgbClr val="FF0000"/>
+            </a:solidFill>
+          </a:ln>
         </p:spPr>
       </p:pic>
     </p:spTree>
     <p:extLst>
       <p:ext uri="{BB962C8B-B14F-4D97-AF65-F5344CB8AC3E}">
-        <p14:creationId xmlns:p14="http://schemas.microsoft.com/office/powerpoint/2010/main" val="978910181"/>
+        <p14:creationId xmlns:p14="http://schemas.microsoft.com/office/powerpoint/2010/main" val="3584882915"/>
       </p:ext>
     </p:extLst>
   </p:cSld>
@@ -4141,7 +4858,7 @@
           <p:cNvPr id="2" name="Title 1">
             <a:extLst>
               <a:ext uri="{FF2B5EF4-FFF2-40B4-BE49-F238E27FC236}">
-                <a16:creationId xmlns:a16="http://schemas.microsoft.com/office/drawing/2014/main" id="{9CB58394-2779-4D9C-AFB7-0A8FC6E82FA2}"/>
+                <a16:creationId xmlns:a16="http://schemas.microsoft.com/office/drawing/2014/main" id="{AE49AE2E-86DB-452D-A0BD-07975F40475E}"/>
               </a:ext>
             </a:extLst>
           </p:cNvPr>
@@ -4159,7 +4876,7 @@
           <a:p>
             <a:r>
               <a:rPr lang="en-US" dirty="0"/>
-              <a:t>Audio page</a:t>
+              <a:t>Available Profile Pictures</a:t>
             </a:r>
           </a:p>
         </p:txBody>
@@ -4169,7 +4886,7 @@
           <p:cNvPr id="3" name="Content Placeholder 2">
             <a:extLst>
               <a:ext uri="{FF2B5EF4-FFF2-40B4-BE49-F238E27FC236}">
-                <a16:creationId xmlns:a16="http://schemas.microsoft.com/office/drawing/2014/main" id="{5783205A-A926-4B9E-B92F-63FF96D003F5}"/>
+                <a16:creationId xmlns:a16="http://schemas.microsoft.com/office/drawing/2014/main" id="{2153A5CE-75CF-4CD3-ABC1-3FC5B2923528}"/>
               </a:ext>
             </a:extLst>
           </p:cNvPr>
@@ -4183,7 +4900,7 @@
         <p:spPr>
           <a:xfrm>
             <a:off x="838200" y="1825625"/>
-            <a:ext cx="5892264" cy="4351338"/>
+            <a:ext cx="5344486" cy="4351338"/>
           </a:xfrm>
         </p:spPr>
         <p:txBody>
@@ -4192,38 +4909,94 @@
           <a:p>
             <a:r>
               <a:rPr lang="en-US" dirty="0"/>
-              <a:t>Navigate to </a:t>
-            </a:r>
-            <a:r>
-              <a:rPr lang="en-US" dirty="0">
-                <a:hlinkClick r:id="rId2"/>
-              </a:rPr>
-              <a:t>http://localhost:3000/html/audio.html</a:t>
-            </a:r>
-            <a:endParaRPr lang="en-US" dirty="0"/>
+              <a:t>Select every option in the “Settings” tab dropdown menu, one-by-one except “Other”.</a:t>
+            </a:r>
           </a:p>
           <a:p>
             <a:pPr lvl="1"/>
             <a:r>
               <a:rPr lang="en-US" dirty="0"/>
-              <a:t>Should see title and buttons centered in screen</a:t>
-            </a:r>
-          </a:p>
-          <a:p>
-            <a:pPr lvl="1"/>
-            <a:r>
-              <a:rPr lang="en-US" dirty="0"/>
-              <a:t>A message should appear telling you that the audio files have been loaded</a:t>
+              <a:t>Profile picture should be updated with the appropriate picture.</a:t>
+            </a:r>
+          </a:p>
+        </p:txBody>
+      </p:sp>
+      <p:sp>
+        <p:nvSpPr>
+          <p:cNvPr id="8" name="TextBox 7">
+            <a:extLst>
+              <a:ext uri="{FF2B5EF4-FFF2-40B4-BE49-F238E27FC236}">
+                <a16:creationId xmlns:a16="http://schemas.microsoft.com/office/drawing/2014/main" id="{46B0B86E-7D87-414E-9FE4-3EB1FA791CB8}"/>
+              </a:ext>
+            </a:extLst>
+          </p:cNvPr>
+          <p:cNvSpPr txBox="1"/>
+          <p:nvPr/>
+        </p:nvSpPr>
+        <p:spPr>
+          <a:xfrm>
+            <a:off x="7163768" y="4017426"/>
+            <a:ext cx="1806925" cy="523220"/>
+          </a:xfrm>
+          <a:prstGeom prst="rect">
+            <a:avLst/>
+          </a:prstGeom>
+          <a:noFill/>
+        </p:spPr>
+        <p:txBody>
+          <a:bodyPr wrap="square" rtlCol="0">
+            <a:spAutoFit/>
+          </a:bodyPr>
+          <a:lstStyle/>
+          <a:p>
+            <a:r>
+              <a:rPr lang="en-US" sz="2800" dirty="0"/>
+              <a:t>Tuna</a:t>
             </a:r>
           </a:p>
         </p:txBody>
       </p:sp>
       <p:pic>
         <p:nvPicPr>
-          <p:cNvPr id="4" name="Picture 3">
-            <a:extLst>
-              <a:ext uri="{FF2B5EF4-FFF2-40B4-BE49-F238E27FC236}">
-                <a16:creationId xmlns:a16="http://schemas.microsoft.com/office/drawing/2014/main" id="{891010E6-3CEE-4026-8896-A26FA2652A75}"/>
+          <p:cNvPr id="5" name="Picture 4">
+            <a:extLst>
+              <a:ext uri="{FF2B5EF4-FFF2-40B4-BE49-F238E27FC236}">
+                <a16:creationId xmlns:a16="http://schemas.microsoft.com/office/drawing/2014/main" id="{9F259FFA-8CF5-4735-BA62-A96A1D229266}"/>
+              </a:ext>
+            </a:extLst>
+          </p:cNvPr>
+          <p:cNvPicPr>
+            <a:picLocks noChangeAspect="1"/>
+          </p:cNvPicPr>
+          <p:nvPr/>
+        </p:nvPicPr>
+        <p:blipFill>
+          <a:blip r:embed="rId2"/>
+          <a:stretch>
+            <a:fillRect/>
+          </a:stretch>
+        </p:blipFill>
+        <p:spPr>
+          <a:xfrm>
+            <a:off x="318456" y="4585640"/>
+            <a:ext cx="1806925" cy="1938680"/>
+          </a:xfrm>
+          <a:prstGeom prst="rect">
+            <a:avLst/>
+          </a:prstGeom>
+          <a:ln>
+            <a:solidFill>
+              <a:srgbClr val="FF0000"/>
+            </a:solidFill>
+          </a:ln>
+        </p:spPr>
+      </p:pic>
+      <p:pic>
+        <p:nvPicPr>
+          <p:cNvPr id="6" name="Picture 5">
+            <a:extLst>
+              <a:ext uri="{FF2B5EF4-FFF2-40B4-BE49-F238E27FC236}">
+                <a16:creationId xmlns:a16="http://schemas.microsoft.com/office/drawing/2014/main" id="{F252A0CB-37FE-4A54-B7B0-AA4E3AB94961}"/>
               </a:ext>
             </a:extLst>
           </p:cNvPr>
@@ -4240,18 +5013,269 @@
         </p:blipFill>
         <p:spPr>
           <a:xfrm>
-            <a:off x="7100597" y="1132910"/>
-            <a:ext cx="3883070" cy="4832886"/>
+            <a:off x="2598716" y="4567907"/>
+            <a:ext cx="1823453" cy="1956413"/>
           </a:xfrm>
           <a:prstGeom prst="rect">
             <a:avLst/>
           </a:prstGeom>
+          <a:ln>
+            <a:solidFill>
+              <a:srgbClr val="FF0000"/>
+            </a:solidFill>
+          </a:ln>
         </p:spPr>
       </p:pic>
+      <p:pic>
+        <p:nvPicPr>
+          <p:cNvPr id="7" name="Picture 6">
+            <a:extLst>
+              <a:ext uri="{FF2B5EF4-FFF2-40B4-BE49-F238E27FC236}">
+                <a16:creationId xmlns:a16="http://schemas.microsoft.com/office/drawing/2014/main" id="{2540FBA9-1459-440C-99F9-0E0798CBAF29}"/>
+              </a:ext>
+            </a:extLst>
+          </p:cNvPr>
+          <p:cNvPicPr>
+            <a:picLocks noChangeAspect="1"/>
+          </p:cNvPicPr>
+          <p:nvPr/>
+        </p:nvPicPr>
+        <p:blipFill>
+          <a:blip r:embed="rId4"/>
+          <a:stretch>
+            <a:fillRect/>
+          </a:stretch>
+        </p:blipFill>
+        <p:spPr>
+          <a:xfrm>
+            <a:off x="4623869" y="4546555"/>
+            <a:ext cx="1823453" cy="1956413"/>
+          </a:xfrm>
+          <a:prstGeom prst="rect">
+            <a:avLst/>
+          </a:prstGeom>
+          <a:ln>
+            <a:solidFill>
+              <a:srgbClr val="FF0000"/>
+            </a:solidFill>
+          </a:ln>
+        </p:spPr>
+      </p:pic>
+      <p:pic>
+        <p:nvPicPr>
+          <p:cNvPr id="11" name="Picture 10">
+            <a:extLst>
+              <a:ext uri="{FF2B5EF4-FFF2-40B4-BE49-F238E27FC236}">
+                <a16:creationId xmlns:a16="http://schemas.microsoft.com/office/drawing/2014/main" id="{06963AE3-0EF7-4674-A93B-EDF5ADE5D905}"/>
+              </a:ext>
+            </a:extLst>
+          </p:cNvPr>
+          <p:cNvPicPr>
+            <a:picLocks noChangeAspect="1"/>
+          </p:cNvPicPr>
+          <p:nvPr/>
+        </p:nvPicPr>
+        <p:blipFill>
+          <a:blip r:embed="rId5"/>
+          <a:stretch>
+            <a:fillRect/>
+          </a:stretch>
+        </p:blipFill>
+        <p:spPr>
+          <a:xfrm>
+            <a:off x="7099342" y="4540646"/>
+            <a:ext cx="1871351" cy="2007804"/>
+          </a:xfrm>
+          <a:prstGeom prst="rect">
+            <a:avLst/>
+          </a:prstGeom>
+          <a:ln>
+            <a:solidFill>
+              <a:srgbClr val="FF0000"/>
+            </a:solidFill>
+          </a:ln>
+        </p:spPr>
+      </p:pic>
+      <p:pic>
+        <p:nvPicPr>
+          <p:cNvPr id="12" name="Picture 11">
+            <a:extLst>
+              <a:ext uri="{FF2B5EF4-FFF2-40B4-BE49-F238E27FC236}">
+                <a16:creationId xmlns:a16="http://schemas.microsoft.com/office/drawing/2014/main" id="{49CDA56C-B3EE-492B-AC2E-6158E4323C0D}"/>
+              </a:ext>
+            </a:extLst>
+          </p:cNvPr>
+          <p:cNvPicPr>
+            <a:picLocks noChangeAspect="1"/>
+          </p:cNvPicPr>
+          <p:nvPr/>
+        </p:nvPicPr>
+        <p:blipFill>
+          <a:blip r:embed="rId6"/>
+          <a:stretch>
+            <a:fillRect/>
+          </a:stretch>
+        </p:blipFill>
+        <p:spPr>
+          <a:xfrm>
+            <a:off x="9751312" y="4516516"/>
+            <a:ext cx="1808727" cy="1940614"/>
+          </a:xfrm>
+          <a:prstGeom prst="rect">
+            <a:avLst/>
+          </a:prstGeom>
+          <a:ln>
+            <a:solidFill>
+              <a:srgbClr val="FF0000"/>
+            </a:solidFill>
+          </a:ln>
+        </p:spPr>
+      </p:pic>
+      <p:sp>
+        <p:nvSpPr>
+          <p:cNvPr id="13" name="TextBox 12">
+            <a:extLst>
+              <a:ext uri="{FF2B5EF4-FFF2-40B4-BE49-F238E27FC236}">
+                <a16:creationId xmlns:a16="http://schemas.microsoft.com/office/drawing/2014/main" id="{160E0879-5708-43BA-8811-42120A5810ED}"/>
+              </a:ext>
+            </a:extLst>
+          </p:cNvPr>
+          <p:cNvSpPr txBox="1"/>
+          <p:nvPr/>
+        </p:nvSpPr>
+        <p:spPr>
+          <a:xfrm>
+            <a:off x="9858868" y="3999536"/>
+            <a:ext cx="1806925" cy="523220"/>
+          </a:xfrm>
+          <a:prstGeom prst="rect">
+            <a:avLst/>
+          </a:prstGeom>
+          <a:noFill/>
+        </p:spPr>
+        <p:txBody>
+          <a:bodyPr wrap="square" rtlCol="0">
+            <a:spAutoFit/>
+          </a:bodyPr>
+          <a:lstStyle/>
+          <a:p>
+            <a:r>
+              <a:rPr lang="en-US" sz="2800" dirty="0" err="1"/>
+              <a:t>JamATuna</a:t>
+            </a:r>
+            <a:endParaRPr lang="en-US" sz="2800" dirty="0"/>
+          </a:p>
+        </p:txBody>
+      </p:sp>
+      <p:sp>
+        <p:nvSpPr>
+          <p:cNvPr id="14" name="TextBox 13">
+            <a:extLst>
+              <a:ext uri="{FF2B5EF4-FFF2-40B4-BE49-F238E27FC236}">
+                <a16:creationId xmlns:a16="http://schemas.microsoft.com/office/drawing/2014/main" id="{521E5C74-FF4F-4224-9B9C-A813D920EC88}"/>
+              </a:ext>
+            </a:extLst>
+          </p:cNvPr>
+          <p:cNvSpPr txBox="1"/>
+          <p:nvPr/>
+        </p:nvSpPr>
+        <p:spPr>
+          <a:xfrm>
+            <a:off x="4732648" y="4017426"/>
+            <a:ext cx="1806925" cy="523220"/>
+          </a:xfrm>
+          <a:prstGeom prst="rect">
+            <a:avLst/>
+          </a:prstGeom>
+          <a:noFill/>
+        </p:spPr>
+        <p:txBody>
+          <a:bodyPr wrap="square" rtlCol="0">
+            <a:spAutoFit/>
+          </a:bodyPr>
+          <a:lstStyle/>
+          <a:p>
+            <a:r>
+              <a:rPr lang="en-US" sz="2800" dirty="0"/>
+              <a:t>Clown Fish</a:t>
+            </a:r>
+          </a:p>
+        </p:txBody>
+      </p:sp>
+      <p:sp>
+        <p:nvSpPr>
+          <p:cNvPr id="15" name="TextBox 14">
+            <a:extLst>
+              <a:ext uri="{FF2B5EF4-FFF2-40B4-BE49-F238E27FC236}">
+                <a16:creationId xmlns:a16="http://schemas.microsoft.com/office/drawing/2014/main" id="{E50B90D6-BBE7-4391-AC13-975A3DA940E7}"/>
+              </a:ext>
+            </a:extLst>
+          </p:cNvPr>
+          <p:cNvSpPr txBox="1"/>
+          <p:nvPr/>
+        </p:nvSpPr>
+        <p:spPr>
+          <a:xfrm>
+            <a:off x="2584124" y="3993296"/>
+            <a:ext cx="1806925" cy="523220"/>
+          </a:xfrm>
+          <a:prstGeom prst="rect">
+            <a:avLst/>
+          </a:prstGeom>
+          <a:noFill/>
+        </p:spPr>
+        <p:txBody>
+          <a:bodyPr wrap="square" rtlCol="0">
+            <a:spAutoFit/>
+          </a:bodyPr>
+          <a:lstStyle/>
+          <a:p>
+            <a:r>
+              <a:rPr lang="en-US" sz="2800" dirty="0"/>
+              <a:t>Blue Fish</a:t>
+            </a:r>
+          </a:p>
+        </p:txBody>
+      </p:sp>
+      <p:sp>
+        <p:nvSpPr>
+          <p:cNvPr id="16" name="TextBox 15">
+            <a:extLst>
+              <a:ext uri="{FF2B5EF4-FFF2-40B4-BE49-F238E27FC236}">
+                <a16:creationId xmlns:a16="http://schemas.microsoft.com/office/drawing/2014/main" id="{5CE0F64F-FBED-481E-B1B4-C0E9277FCC47}"/>
+              </a:ext>
+            </a:extLst>
+          </p:cNvPr>
+          <p:cNvSpPr txBox="1"/>
+          <p:nvPr/>
+        </p:nvSpPr>
+        <p:spPr>
+          <a:xfrm>
+            <a:off x="254553" y="4017426"/>
+            <a:ext cx="1934732" cy="523220"/>
+          </a:xfrm>
+          <a:prstGeom prst="rect">
+            <a:avLst/>
+          </a:prstGeom>
+          <a:noFill/>
+        </p:spPr>
+        <p:txBody>
+          <a:bodyPr wrap="square" rtlCol="0">
+            <a:spAutoFit/>
+          </a:bodyPr>
+          <a:lstStyle/>
+          <a:p>
+            <a:r>
+              <a:rPr lang="en-US" sz="2800" dirty="0"/>
+              <a:t>Orange Fish</a:t>
+            </a:r>
+          </a:p>
+        </p:txBody>
+      </p:sp>
     </p:spTree>
     <p:extLst>
       <p:ext uri="{BB962C8B-B14F-4D97-AF65-F5344CB8AC3E}">
-        <p14:creationId xmlns:p14="http://schemas.microsoft.com/office/powerpoint/2010/main" val="3120464656"/>
+        <p14:creationId xmlns:p14="http://schemas.microsoft.com/office/powerpoint/2010/main" val="4285551638"/>
       </p:ext>
     </p:extLst>
   </p:cSld>
@@ -4283,7 +5307,7 @@
           <p:cNvPr id="2" name="Title 1">
             <a:extLst>
               <a:ext uri="{FF2B5EF4-FFF2-40B4-BE49-F238E27FC236}">
-                <a16:creationId xmlns:a16="http://schemas.microsoft.com/office/drawing/2014/main" id="{6385F505-6C66-43DD-A624-E0218062F6B7}"/>
+                <a16:creationId xmlns:a16="http://schemas.microsoft.com/office/drawing/2014/main" id="{AE49AE2E-86DB-452D-A0BD-07975F40475E}"/>
               </a:ext>
             </a:extLst>
           </p:cNvPr>
@@ -4301,7 +5325,7 @@
           <a:p>
             <a:r>
               <a:rPr lang="en-US" dirty="0"/>
-              <a:t>Audio page</a:t>
+              <a:t>Uploading Profile Pictures</a:t>
             </a:r>
           </a:p>
         </p:txBody>
@@ -4311,7 +5335,7 @@
           <p:cNvPr id="3" name="Content Placeholder 2">
             <a:extLst>
               <a:ext uri="{FF2B5EF4-FFF2-40B4-BE49-F238E27FC236}">
-                <a16:creationId xmlns:a16="http://schemas.microsoft.com/office/drawing/2014/main" id="{EB5B5BBD-ED9A-426B-8A46-E4A2CF0B267D}"/>
+                <a16:creationId xmlns:a16="http://schemas.microsoft.com/office/drawing/2014/main" id="{2153A5CE-75CF-4CD3-ABC1-3FC5B2923528}"/>
               </a:ext>
             </a:extLst>
           </p:cNvPr>
@@ -4325,47 +5349,91 @@
         <p:spPr>
           <a:xfrm>
             <a:off x="838200" y="1825625"/>
-            <a:ext cx="4582886" cy="4351338"/>
-          </a:xfrm>
-        </p:spPr>
-        <p:txBody>
-          <a:bodyPr/>
+            <a:ext cx="5344486" cy="4351338"/>
+          </a:xfrm>
+        </p:spPr>
+        <p:txBody>
+          <a:bodyPr>
+            <a:normAutofit fontScale="92500" lnSpcReduction="10000"/>
+          </a:bodyPr>
           <a:lstStyle/>
           <a:p>
             <a:r>
               <a:rPr lang="en-US" dirty="0"/>
-              <a:t>Continued</a:t>
+              <a:t>Select “Other” from dropdown menu in “Settings tab.</a:t>
             </a:r>
           </a:p>
           <a:p>
             <a:pPr lvl="1"/>
             <a:r>
               <a:rPr lang="en-US" dirty="0"/>
-              <a:t>Pressing a button on either tab will play an audio file</a:t>
+              <a:t>File upload button with “Upload Profile Picture” label and “Upload” button should now appear, and they should disappear after selecting a different option from dropdown menu.</a:t>
             </a:r>
           </a:p>
           <a:p>
             <a:pPr lvl="1"/>
             <a:r>
               <a:rPr lang="en-US" dirty="0"/>
-              <a:t>Audio files should be played on both tabs</a:t>
+              <a:t>File upload button should bring up File Explorer or similar file upload window</a:t>
             </a:r>
           </a:p>
           <a:p>
             <a:pPr lvl="1"/>
             <a:r>
               <a:rPr lang="en-US" dirty="0"/>
-              <a:t>Sound should be in sync no matter how irregular clicks are made</a:t>
+              <a:t>Selecting a file should immediately update the profile picture with the image file.</a:t>
+            </a:r>
+          </a:p>
+          <a:p>
+            <a:pPr lvl="1"/>
+            <a:r>
+              <a:rPr lang="en-US" dirty="0"/>
+              <a:t>“Upload” button to be implemented in the future</a:t>
+            </a:r>
+          </a:p>
+        </p:txBody>
+      </p:sp>
+      <p:sp>
+        <p:nvSpPr>
+          <p:cNvPr id="13" name="TextBox 12">
+            <a:extLst>
+              <a:ext uri="{FF2B5EF4-FFF2-40B4-BE49-F238E27FC236}">
+                <a16:creationId xmlns:a16="http://schemas.microsoft.com/office/drawing/2014/main" id="{160E0879-5708-43BA-8811-42120A5810ED}"/>
+              </a:ext>
+            </a:extLst>
+          </p:cNvPr>
+          <p:cNvSpPr txBox="1"/>
+          <p:nvPr/>
+        </p:nvSpPr>
+        <p:spPr>
+          <a:xfrm>
+            <a:off x="7011447" y="504686"/>
+            <a:ext cx="4890613" cy="523220"/>
+          </a:xfrm>
+          <a:prstGeom prst="rect">
+            <a:avLst/>
+          </a:prstGeom>
+          <a:noFill/>
+        </p:spPr>
+        <p:txBody>
+          <a:bodyPr wrap="square" rtlCol="0">
+            <a:spAutoFit/>
+          </a:bodyPr>
+          <a:lstStyle/>
+          <a:p>
+            <a:r>
+              <a:rPr lang="en-US" sz="2800" dirty="0"/>
+              <a:t>“Upload Profile Picture” Option</a:t>
             </a:r>
           </a:p>
         </p:txBody>
       </p:sp>
       <p:pic>
         <p:nvPicPr>
-          <p:cNvPr id="4" name="Picture 3">
-            <a:extLst>
-              <a:ext uri="{FF2B5EF4-FFF2-40B4-BE49-F238E27FC236}">
-                <a16:creationId xmlns:a16="http://schemas.microsoft.com/office/drawing/2014/main" id="{1C252AD4-2BA1-4D85-BA3F-E008D50DFBDE}"/>
+          <p:cNvPr id="9" name="Picture 8">
+            <a:extLst>
+              <a:ext uri="{FF2B5EF4-FFF2-40B4-BE49-F238E27FC236}">
+                <a16:creationId xmlns:a16="http://schemas.microsoft.com/office/drawing/2014/main" id="{D3392BFB-22D6-4A46-8B23-FAC3825D11C8}"/>
               </a:ext>
             </a:extLst>
           </p:cNvPr>
@@ -4382,18 +5450,256 @@
         </p:blipFill>
         <p:spPr>
           <a:xfrm>
-            <a:off x="5607698" y="1690688"/>
-            <a:ext cx="6234180" cy="3820234"/>
+            <a:off x="6201480" y="3701561"/>
+            <a:ext cx="5700581" cy="1407165"/>
           </a:xfrm>
           <a:prstGeom prst="rect">
             <a:avLst/>
           </a:prstGeom>
+          <a:ln>
+            <a:solidFill>
+              <a:srgbClr val="FF0000"/>
+            </a:solidFill>
+          </a:ln>
+        </p:spPr>
+      </p:pic>
+      <p:pic>
+        <p:nvPicPr>
+          <p:cNvPr id="10" name="Picture 9">
+            <a:extLst>
+              <a:ext uri="{FF2B5EF4-FFF2-40B4-BE49-F238E27FC236}">
+                <a16:creationId xmlns:a16="http://schemas.microsoft.com/office/drawing/2014/main" id="{6467FCA6-B246-4CE6-AB14-CD337605ECC6}"/>
+              </a:ext>
+            </a:extLst>
+          </p:cNvPr>
+          <p:cNvPicPr>
+            <a:picLocks noChangeAspect="1"/>
+          </p:cNvPicPr>
+          <p:nvPr/>
+        </p:nvPicPr>
+        <p:blipFill>
+          <a:blip r:embed="rId3"/>
+          <a:stretch>
+            <a:fillRect/>
+          </a:stretch>
+        </p:blipFill>
+        <p:spPr>
+          <a:xfrm>
+            <a:off x="6201480" y="1371313"/>
+            <a:ext cx="5845550" cy="1468602"/>
+          </a:xfrm>
+          <a:prstGeom prst="rect">
+            <a:avLst/>
+          </a:prstGeom>
+          <a:ln>
+            <a:solidFill>
+              <a:srgbClr val="FF0000"/>
+            </a:solidFill>
+          </a:ln>
+        </p:spPr>
+      </p:pic>
+      <p:sp>
+        <p:nvSpPr>
+          <p:cNvPr id="17" name="TextBox 16">
+            <a:extLst>
+              <a:ext uri="{FF2B5EF4-FFF2-40B4-BE49-F238E27FC236}">
+                <a16:creationId xmlns:a16="http://schemas.microsoft.com/office/drawing/2014/main" id="{20331B25-157D-4288-A37A-B21E8C0BD771}"/>
+              </a:ext>
+            </a:extLst>
+          </p:cNvPr>
+          <p:cNvSpPr txBox="1"/>
+          <p:nvPr/>
+        </p:nvSpPr>
+        <p:spPr>
+          <a:xfrm>
+            <a:off x="7011447" y="3080378"/>
+            <a:ext cx="4890613" cy="523220"/>
+          </a:xfrm>
+          <a:prstGeom prst="rect">
+            <a:avLst/>
+          </a:prstGeom>
+          <a:noFill/>
+        </p:spPr>
+        <p:txBody>
+          <a:bodyPr wrap="square" rtlCol="0">
+            <a:spAutoFit/>
+          </a:bodyPr>
+          <a:lstStyle/>
+          <a:p>
+            <a:r>
+              <a:rPr lang="en-US" sz="2800" dirty="0"/>
+              <a:t>After Selecting Image File</a:t>
+            </a:r>
+          </a:p>
+        </p:txBody>
+      </p:sp>
+    </p:spTree>
+    <p:extLst>
+      <p:ext uri="{BB962C8B-B14F-4D97-AF65-F5344CB8AC3E}">
+        <p14:creationId xmlns:p14="http://schemas.microsoft.com/office/powerpoint/2010/main" val="355234667"/>
+      </p:ext>
+    </p:extLst>
+  </p:cSld>
+  <p:clrMapOvr>
+    <a:masterClrMapping/>
+  </p:clrMapOvr>
+</p:sld>
+</file>
+
+<file path=ppt/slides/slide9.xml><?xml version="1.0" encoding="utf-8"?>
+<p:sld xmlns:a="http://schemas.openxmlformats.org/drawingml/2006/main" xmlns:r="http://schemas.openxmlformats.org/officeDocument/2006/relationships" xmlns:p="http://schemas.openxmlformats.org/presentationml/2006/main">
+  <p:cSld>
+    <p:spTree>
+      <p:nvGrpSpPr>
+        <p:cNvPr id="1" name=""/>
+        <p:cNvGrpSpPr/>
+        <p:nvPr/>
+      </p:nvGrpSpPr>
+      <p:grpSpPr>
+        <a:xfrm>
+          <a:off x="0" y="0"/>
+          <a:ext cx="0" cy="0"/>
+          <a:chOff x="0" y="0"/>
+          <a:chExt cx="0" cy="0"/>
+        </a:xfrm>
+      </p:grpSpPr>
+      <p:sp>
+        <p:nvSpPr>
+          <p:cNvPr id="2" name="Title 1">
+            <a:extLst>
+              <a:ext uri="{FF2B5EF4-FFF2-40B4-BE49-F238E27FC236}">
+                <a16:creationId xmlns:a16="http://schemas.microsoft.com/office/drawing/2014/main" id="{58D0B2D1-18F7-450F-BAB9-639133F126A0}"/>
+              </a:ext>
+            </a:extLst>
+          </p:cNvPr>
+          <p:cNvSpPr>
+            <a:spLocks noGrp="1"/>
+          </p:cNvSpPr>
+          <p:nvPr>
+            <p:ph type="title"/>
+          </p:nvPr>
+        </p:nvSpPr>
+        <p:spPr/>
+        <p:txBody>
+          <a:bodyPr/>
+          <a:lstStyle/>
+          <a:p>
+            <a:r>
+              <a:rPr lang="en-US" dirty="0"/>
+              <a:t>Chat Page</a:t>
+            </a:r>
+          </a:p>
+        </p:txBody>
+      </p:sp>
+      <p:sp>
+        <p:nvSpPr>
+          <p:cNvPr id="3" name="Content Placeholder 2">
+            <a:extLst>
+              <a:ext uri="{FF2B5EF4-FFF2-40B4-BE49-F238E27FC236}">
+                <a16:creationId xmlns:a16="http://schemas.microsoft.com/office/drawing/2014/main" id="{5AACEC3F-24D1-456D-A268-CBFB921AF972}"/>
+              </a:ext>
+            </a:extLst>
+          </p:cNvPr>
+          <p:cNvSpPr>
+            <a:spLocks noGrp="1"/>
+          </p:cNvSpPr>
+          <p:nvPr>
+            <p:ph idx="1"/>
+          </p:nvPr>
+        </p:nvSpPr>
+        <p:spPr>
+          <a:xfrm>
+            <a:off x="838200" y="1825625"/>
+            <a:ext cx="4287473" cy="4351338"/>
+          </a:xfrm>
+        </p:spPr>
+        <p:txBody>
+          <a:bodyPr>
+            <a:normAutofit fontScale="92500" lnSpcReduction="20000"/>
+          </a:bodyPr>
+          <a:lstStyle/>
+          <a:p>
+            <a:r>
+              <a:rPr lang="en-US" dirty="0"/>
+              <a:t>Click “Chat” button on home page.</a:t>
+            </a:r>
+          </a:p>
+          <a:p>
+            <a:pPr lvl="1"/>
+            <a:r>
+              <a:rPr lang="en-US" dirty="0"/>
+              <a:t>Should navigate to </a:t>
+            </a:r>
+            <a:r>
+              <a:rPr lang="en-US" dirty="0">
+                <a:hlinkClick r:id="rId2"/>
+              </a:rPr>
+              <a:t>http://localhost:3000/html/chat.html</a:t>
+            </a:r>
+            <a:endParaRPr lang="en-US" dirty="0"/>
+          </a:p>
+          <a:p>
+            <a:pPr lvl="1"/>
+            <a:r>
+              <a:rPr lang="en-US" dirty="0"/>
+              <a:t>From left to right at the bottom of the page, should see username box, message box, then “Send button</a:t>
+            </a:r>
+          </a:p>
+          <a:p>
+            <a:pPr lvl="1"/>
+            <a:r>
+              <a:rPr lang="en-US" dirty="0"/>
+              <a:t>Username box should be empty with “Enter username” placeholder.</a:t>
+            </a:r>
+          </a:p>
+          <a:p>
+            <a:pPr lvl="1"/>
+            <a:r>
+              <a:rPr lang="en-US" dirty="0"/>
+              <a:t>Message box should be empty with “Enter message” placeholder.</a:t>
+            </a:r>
+          </a:p>
+        </p:txBody>
+      </p:sp>
+      <p:pic>
+        <p:nvPicPr>
+          <p:cNvPr id="11" name="Picture 10">
+            <a:extLst>
+              <a:ext uri="{FF2B5EF4-FFF2-40B4-BE49-F238E27FC236}">
+                <a16:creationId xmlns:a16="http://schemas.microsoft.com/office/drawing/2014/main" id="{75B2460B-8189-41E0-AD4B-AA95555C3174}"/>
+              </a:ext>
+            </a:extLst>
+          </p:cNvPr>
+          <p:cNvPicPr>
+            <a:picLocks noChangeAspect="1"/>
+          </p:cNvPicPr>
+          <p:nvPr/>
+        </p:nvPicPr>
+        <p:blipFill>
+          <a:blip r:embed="rId3"/>
+          <a:stretch>
+            <a:fillRect/>
+          </a:stretch>
+        </p:blipFill>
+        <p:spPr>
+          <a:xfrm>
+            <a:off x="5239989" y="1690688"/>
+            <a:ext cx="6321583" cy="3391266"/>
+          </a:xfrm>
+          <a:prstGeom prst="rect">
+            <a:avLst/>
+          </a:prstGeom>
+          <a:ln>
+            <a:solidFill>
+              <a:srgbClr val="FF0000"/>
+            </a:solidFill>
+          </a:ln>
         </p:spPr>
       </p:pic>
     </p:spTree>
     <p:extLst>
       <p:ext uri="{BB962C8B-B14F-4D97-AF65-F5344CB8AC3E}">
-        <p14:creationId xmlns:p14="http://schemas.microsoft.com/office/powerpoint/2010/main" val="849073764"/>
+        <p14:creationId xmlns:p14="http://schemas.microsoft.com/office/powerpoint/2010/main" val="978910181"/>
       </p:ext>
     </p:extLst>
   </p:cSld>

</xml_diff>

<commit_message>
Finish updating chat page section in manual test plan.
</commit_message>
<xml_diff>
--- a/Test Plan.pptx
+++ b/Test Plan.pptx
@@ -15,8 +15,9 @@
     <p:sldId id="266" r:id="rId9"/>
     <p:sldId id="261" r:id="rId10"/>
     <p:sldId id="267" r:id="rId11"/>
-    <p:sldId id="262" r:id="rId12"/>
-    <p:sldId id="263" r:id="rId13"/>
+    <p:sldId id="268" r:id="rId12"/>
+    <p:sldId id="262" r:id="rId13"/>
+    <p:sldId id="263" r:id="rId14"/>
   </p:sldIdLst>
   <p:sldSz cx="12192000" cy="6858000"/>
   <p:notesSz cx="6858000" cy="9144000"/>
@@ -3472,7 +3473,7 @@
         </p:spPr>
         <p:txBody>
           <a:bodyPr>
-            <a:normAutofit lnSpcReduction="10000"/>
+            <a:normAutofit fontScale="92500" lnSpcReduction="20000"/>
           </a:bodyPr>
           <a:lstStyle/>
           <a:p>
@@ -3507,6 +3508,13 @@
             <a:r>
               <a:rPr lang="en-US" dirty="0"/>
               <a:t>Every odd-numbered message should have a gray background.</a:t>
+            </a:r>
+          </a:p>
+          <a:p>
+            <a:pPr lvl="1"/>
+            <a:r>
+              <a:rPr lang="en-US" dirty="0"/>
+              <a:t>Message box should become empty after a message is sent.</a:t>
             </a:r>
           </a:p>
         </p:txBody>
@@ -3533,8 +3541,78 @@
         </p:blipFill>
         <p:spPr>
           <a:xfrm>
-            <a:off x="6497515" y="365125"/>
-            <a:ext cx="5227558" cy="2809813"/>
+            <a:off x="8239328" y="365125"/>
+            <a:ext cx="3261206" cy="1752898"/>
+          </a:xfrm>
+          <a:prstGeom prst="rect">
+            <a:avLst/>
+          </a:prstGeom>
+          <a:ln>
+            <a:solidFill>
+              <a:srgbClr val="FF0000"/>
+            </a:solidFill>
+          </a:ln>
+        </p:spPr>
+      </p:pic>
+      <p:pic>
+        <p:nvPicPr>
+          <p:cNvPr id="5" name="Picture 4">
+            <a:extLst>
+              <a:ext uri="{FF2B5EF4-FFF2-40B4-BE49-F238E27FC236}">
+                <a16:creationId xmlns:a16="http://schemas.microsoft.com/office/drawing/2014/main" id="{B854E197-2DF3-4E0B-8863-A4DDCDDEFEE1}"/>
+              </a:ext>
+            </a:extLst>
+          </p:cNvPr>
+          <p:cNvPicPr>
+            <a:picLocks noChangeAspect="1"/>
+          </p:cNvPicPr>
+          <p:nvPr/>
+        </p:nvPicPr>
+        <p:blipFill>
+          <a:blip r:embed="rId3"/>
+          <a:stretch>
+            <a:fillRect/>
+          </a:stretch>
+        </p:blipFill>
+        <p:spPr>
+          <a:xfrm>
+            <a:off x="6366566" y="1957766"/>
+            <a:ext cx="3261206" cy="1751200"/>
+          </a:xfrm>
+          <a:prstGeom prst="rect">
+            <a:avLst/>
+          </a:prstGeom>
+          <a:ln>
+            <a:solidFill>
+              <a:srgbClr val="FF0000"/>
+            </a:solidFill>
+          </a:ln>
+        </p:spPr>
+      </p:pic>
+      <p:pic>
+        <p:nvPicPr>
+          <p:cNvPr id="6" name="Picture 5">
+            <a:extLst>
+              <a:ext uri="{FF2B5EF4-FFF2-40B4-BE49-F238E27FC236}">
+                <a16:creationId xmlns:a16="http://schemas.microsoft.com/office/drawing/2014/main" id="{1B1083CC-9511-46CB-894B-57A03FDE3309}"/>
+              </a:ext>
+            </a:extLst>
+          </p:cNvPr>
+          <p:cNvPicPr>
+            <a:picLocks noChangeAspect="1"/>
+          </p:cNvPicPr>
+          <p:nvPr/>
+        </p:nvPicPr>
+        <p:blipFill>
+          <a:blip r:embed="rId4"/>
+          <a:stretch>
+            <a:fillRect/>
+          </a:stretch>
+        </p:blipFill>
+        <p:spPr>
+          <a:xfrm>
+            <a:off x="6575768" y="3976045"/>
+            <a:ext cx="5217398" cy="2801634"/>
           </a:xfrm>
           <a:prstGeom prst="rect">
             <a:avLst/>
@@ -3581,6 +3659,344 @@
           <p:cNvPr id="2" name="Title 1">
             <a:extLst>
               <a:ext uri="{FF2B5EF4-FFF2-40B4-BE49-F238E27FC236}">
+                <a16:creationId xmlns:a16="http://schemas.microsoft.com/office/drawing/2014/main" id="{58D0B2D1-18F7-450F-BAB9-639133F126A0}"/>
+              </a:ext>
+            </a:extLst>
+          </p:cNvPr>
+          <p:cNvSpPr>
+            <a:spLocks noGrp="1"/>
+          </p:cNvSpPr>
+          <p:nvPr>
+            <p:ph type="title"/>
+          </p:nvPr>
+        </p:nvSpPr>
+        <p:spPr/>
+        <p:txBody>
+          <a:bodyPr/>
+          <a:lstStyle/>
+          <a:p>
+            <a:pPr algn="ctr"/>
+            <a:r>
+              <a:rPr lang="en-US" dirty="0"/>
+              <a:t>Chat Page Example</a:t>
+            </a:r>
+          </a:p>
+        </p:txBody>
+      </p:sp>
+      <p:pic>
+        <p:nvPicPr>
+          <p:cNvPr id="10" name="Picture 9">
+            <a:extLst>
+              <a:ext uri="{FF2B5EF4-FFF2-40B4-BE49-F238E27FC236}">
+                <a16:creationId xmlns:a16="http://schemas.microsoft.com/office/drawing/2014/main" id="{B6A16A47-18D5-487C-8C03-E201291CE532}"/>
+              </a:ext>
+            </a:extLst>
+          </p:cNvPr>
+          <p:cNvPicPr>
+            <a:picLocks noChangeAspect="1"/>
+          </p:cNvPicPr>
+          <p:nvPr/>
+        </p:nvPicPr>
+        <p:blipFill>
+          <a:blip r:embed="rId2"/>
+          <a:stretch>
+            <a:fillRect/>
+          </a:stretch>
+        </p:blipFill>
+        <p:spPr>
+          <a:xfrm>
+            <a:off x="449344" y="1766085"/>
+            <a:ext cx="3225842" cy="1733890"/>
+          </a:xfrm>
+          <a:prstGeom prst="rect">
+            <a:avLst/>
+          </a:prstGeom>
+          <a:ln>
+            <a:solidFill>
+              <a:srgbClr val="FF0000"/>
+            </a:solidFill>
+          </a:ln>
+        </p:spPr>
+      </p:pic>
+      <p:pic>
+        <p:nvPicPr>
+          <p:cNvPr id="5" name="Picture 4">
+            <a:extLst>
+              <a:ext uri="{FF2B5EF4-FFF2-40B4-BE49-F238E27FC236}">
+                <a16:creationId xmlns:a16="http://schemas.microsoft.com/office/drawing/2014/main" id="{B854E197-2DF3-4E0B-8863-A4DDCDDEFEE1}"/>
+              </a:ext>
+            </a:extLst>
+          </p:cNvPr>
+          <p:cNvPicPr>
+            <a:picLocks noChangeAspect="1"/>
+          </p:cNvPicPr>
+          <p:nvPr/>
+        </p:nvPicPr>
+        <p:blipFill>
+          <a:blip r:embed="rId3"/>
+          <a:stretch>
+            <a:fillRect/>
+          </a:stretch>
+        </p:blipFill>
+        <p:spPr>
+          <a:xfrm>
+            <a:off x="8124833" y="1766086"/>
+            <a:ext cx="3228968" cy="1733889"/>
+          </a:xfrm>
+          <a:prstGeom prst="rect">
+            <a:avLst/>
+          </a:prstGeom>
+          <a:ln>
+            <a:solidFill>
+              <a:srgbClr val="FF0000"/>
+            </a:solidFill>
+          </a:ln>
+        </p:spPr>
+      </p:pic>
+      <p:pic>
+        <p:nvPicPr>
+          <p:cNvPr id="6" name="Picture 5">
+            <a:extLst>
+              <a:ext uri="{FF2B5EF4-FFF2-40B4-BE49-F238E27FC236}">
+                <a16:creationId xmlns:a16="http://schemas.microsoft.com/office/drawing/2014/main" id="{1B1083CC-9511-46CB-894B-57A03FDE3309}"/>
+              </a:ext>
+            </a:extLst>
+          </p:cNvPr>
+          <p:cNvPicPr>
+            <a:picLocks noChangeAspect="1"/>
+          </p:cNvPicPr>
+          <p:nvPr/>
+        </p:nvPicPr>
+        <p:blipFill>
+          <a:blip r:embed="rId4"/>
+          <a:stretch>
+            <a:fillRect/>
+          </a:stretch>
+        </p:blipFill>
+        <p:spPr>
+          <a:xfrm>
+            <a:off x="449344" y="4342819"/>
+            <a:ext cx="3228971" cy="1733890"/>
+          </a:xfrm>
+          <a:prstGeom prst="rect">
+            <a:avLst/>
+          </a:prstGeom>
+          <a:ln>
+            <a:solidFill>
+              <a:srgbClr val="FF0000"/>
+            </a:solidFill>
+          </a:ln>
+        </p:spPr>
+      </p:pic>
+      <p:sp>
+        <p:nvSpPr>
+          <p:cNvPr id="8" name="TextBox 7">
+            <a:extLst>
+              <a:ext uri="{FF2B5EF4-FFF2-40B4-BE49-F238E27FC236}">
+                <a16:creationId xmlns:a16="http://schemas.microsoft.com/office/drawing/2014/main" id="{21620E91-C13E-4BB2-8242-DC1B272BA9D0}"/>
+              </a:ext>
+            </a:extLst>
+          </p:cNvPr>
+          <p:cNvSpPr txBox="1"/>
+          <p:nvPr/>
+        </p:nvSpPr>
+        <p:spPr>
+          <a:xfrm>
+            <a:off x="446217" y="3736731"/>
+            <a:ext cx="3228970" cy="369332"/>
+          </a:xfrm>
+          <a:prstGeom prst="rect">
+            <a:avLst/>
+          </a:prstGeom>
+          <a:noFill/>
+        </p:spPr>
+        <p:txBody>
+          <a:bodyPr wrap="square" rtlCol="0">
+            <a:spAutoFit/>
+          </a:bodyPr>
+          <a:lstStyle/>
+          <a:p>
+            <a:pPr algn="ctr"/>
+            <a:r>
+              <a:rPr lang="en-US" dirty="0"/>
+              <a:t>Step 1</a:t>
+            </a:r>
+          </a:p>
+        </p:txBody>
+      </p:sp>
+      <p:sp>
+        <p:nvSpPr>
+          <p:cNvPr id="11" name="TextBox 10">
+            <a:extLst>
+              <a:ext uri="{FF2B5EF4-FFF2-40B4-BE49-F238E27FC236}">
+                <a16:creationId xmlns:a16="http://schemas.microsoft.com/office/drawing/2014/main" id="{57453DA4-4CB6-4BC0-BE37-456A164E6D09}"/>
+              </a:ext>
+            </a:extLst>
+          </p:cNvPr>
+          <p:cNvSpPr txBox="1"/>
+          <p:nvPr/>
+        </p:nvSpPr>
+        <p:spPr>
+          <a:xfrm>
+            <a:off x="8124832" y="3736731"/>
+            <a:ext cx="3228968" cy="369332"/>
+          </a:xfrm>
+          <a:prstGeom prst="rect">
+            <a:avLst/>
+          </a:prstGeom>
+          <a:noFill/>
+        </p:spPr>
+        <p:txBody>
+          <a:bodyPr wrap="square" rtlCol="0">
+            <a:spAutoFit/>
+          </a:bodyPr>
+          <a:lstStyle/>
+          <a:p>
+            <a:pPr algn="ctr"/>
+            <a:r>
+              <a:rPr lang="en-US" dirty="0"/>
+              <a:t>Step 2</a:t>
+            </a:r>
+          </a:p>
+        </p:txBody>
+      </p:sp>
+      <p:sp>
+        <p:nvSpPr>
+          <p:cNvPr id="12" name="TextBox 11">
+            <a:extLst>
+              <a:ext uri="{FF2B5EF4-FFF2-40B4-BE49-F238E27FC236}">
+                <a16:creationId xmlns:a16="http://schemas.microsoft.com/office/drawing/2014/main" id="{FDA235D5-8814-4ED4-8FBC-B2177F1F748A}"/>
+              </a:ext>
+            </a:extLst>
+          </p:cNvPr>
+          <p:cNvSpPr txBox="1"/>
+          <p:nvPr/>
+        </p:nvSpPr>
+        <p:spPr>
+          <a:xfrm>
+            <a:off x="446216" y="6308209"/>
+            <a:ext cx="3228970" cy="369332"/>
+          </a:xfrm>
+          <a:prstGeom prst="rect">
+            <a:avLst/>
+          </a:prstGeom>
+          <a:noFill/>
+        </p:spPr>
+        <p:txBody>
+          <a:bodyPr wrap="square" rtlCol="0">
+            <a:spAutoFit/>
+          </a:bodyPr>
+          <a:lstStyle/>
+          <a:p>
+            <a:pPr algn="ctr"/>
+            <a:r>
+              <a:rPr lang="en-US" dirty="0"/>
+              <a:t>Step 3</a:t>
+            </a:r>
+          </a:p>
+        </p:txBody>
+      </p:sp>
+      <p:sp>
+        <p:nvSpPr>
+          <p:cNvPr id="13" name="TextBox 12">
+            <a:extLst>
+              <a:ext uri="{FF2B5EF4-FFF2-40B4-BE49-F238E27FC236}">
+                <a16:creationId xmlns:a16="http://schemas.microsoft.com/office/drawing/2014/main" id="{1CBAE964-E6D3-4F2E-984E-927025F17CC3}"/>
+              </a:ext>
+            </a:extLst>
+          </p:cNvPr>
+          <p:cNvSpPr txBox="1"/>
+          <p:nvPr/>
+        </p:nvSpPr>
+        <p:spPr>
+          <a:xfrm>
+            <a:off x="8124832" y="6152106"/>
+            <a:ext cx="3228970" cy="369332"/>
+          </a:xfrm>
+          <a:prstGeom prst="rect">
+            <a:avLst/>
+          </a:prstGeom>
+          <a:noFill/>
+        </p:spPr>
+        <p:txBody>
+          <a:bodyPr wrap="square" rtlCol="0">
+            <a:spAutoFit/>
+          </a:bodyPr>
+          <a:lstStyle/>
+          <a:p>
+            <a:pPr algn="ctr"/>
+            <a:r>
+              <a:rPr lang="en-US" dirty="0"/>
+              <a:t>Step 4</a:t>
+            </a:r>
+          </a:p>
+        </p:txBody>
+      </p:sp>
+      <p:pic>
+        <p:nvPicPr>
+          <p:cNvPr id="14" name="Picture 13">
+            <a:extLst>
+              <a:ext uri="{FF2B5EF4-FFF2-40B4-BE49-F238E27FC236}">
+                <a16:creationId xmlns:a16="http://schemas.microsoft.com/office/drawing/2014/main" id="{54FF27F3-005A-4877-8991-35523C6CC47D}"/>
+              </a:ext>
+            </a:extLst>
+          </p:cNvPr>
+          <p:cNvPicPr>
+            <a:picLocks noChangeAspect="1"/>
+          </p:cNvPicPr>
+          <p:nvPr/>
+        </p:nvPicPr>
+        <p:blipFill>
+          <a:blip r:embed="rId5"/>
+          <a:stretch>
+            <a:fillRect/>
+          </a:stretch>
+        </p:blipFill>
+        <p:spPr>
+          <a:xfrm>
+            <a:off x="8124832" y="4342819"/>
+            <a:ext cx="3228972" cy="1733890"/>
+          </a:xfrm>
+          <a:prstGeom prst="rect">
+            <a:avLst/>
+          </a:prstGeom>
+        </p:spPr>
+      </p:pic>
+    </p:spTree>
+    <p:extLst>
+      <p:ext uri="{BB962C8B-B14F-4D97-AF65-F5344CB8AC3E}">
+        <p14:creationId xmlns:p14="http://schemas.microsoft.com/office/powerpoint/2010/main" val="3935589030"/>
+      </p:ext>
+    </p:extLst>
+  </p:cSld>
+  <p:clrMapOvr>
+    <a:masterClrMapping/>
+  </p:clrMapOvr>
+</p:sld>
+</file>
+
+<file path=ppt/slides/slide12.xml><?xml version="1.0" encoding="utf-8"?>
+<p:sld xmlns:a="http://schemas.openxmlformats.org/drawingml/2006/main" xmlns:r="http://schemas.openxmlformats.org/officeDocument/2006/relationships" xmlns:p="http://schemas.openxmlformats.org/presentationml/2006/main">
+  <p:cSld>
+    <p:spTree>
+      <p:nvGrpSpPr>
+        <p:cNvPr id="1" name=""/>
+        <p:cNvGrpSpPr/>
+        <p:nvPr/>
+      </p:nvGrpSpPr>
+      <p:grpSpPr>
+        <a:xfrm>
+          <a:off x="0" y="0"/>
+          <a:ext cx="0" cy="0"/>
+          <a:chOff x="0" y="0"/>
+          <a:chExt cx="0" cy="0"/>
+        </a:xfrm>
+      </p:grpSpPr>
+      <p:sp>
+        <p:nvSpPr>
+          <p:cNvPr id="2" name="Title 1">
+            <a:extLst>
+              <a:ext uri="{FF2B5EF4-FFF2-40B4-BE49-F238E27FC236}">
                 <a16:creationId xmlns:a16="http://schemas.microsoft.com/office/drawing/2014/main" id="{9CB58394-2779-4D9C-AFB7-0A8FC6E82FA2}"/>
               </a:ext>
             </a:extLst>
@@ -3701,7 +4117,7 @@
 </p:sld>
 </file>
 
-<file path=ppt/slides/slide12.xml><?xml version="1.0" encoding="utf-8"?>
+<file path=ppt/slides/slide13.xml><?xml version="1.0" encoding="utf-8"?>
 <p:sld xmlns:a="http://schemas.openxmlformats.org/drawingml/2006/main" xmlns:r="http://schemas.openxmlformats.org/officeDocument/2006/relationships" xmlns:p="http://schemas.openxmlformats.org/presentationml/2006/main">
   <p:cSld>
     <p:spTree>

</xml_diff>

<commit_message>
week 2 stuff done lol
</commit_message>
<xml_diff>
--- a/Test Plan.pptx
+++ b/Test Plan.pptx
@@ -111,6 +111,11 @@
       </a:defRPr>
     </a:lvl9pPr>
   </p:defaultTextStyle>
+  <p:extLst>
+    <p:ext uri="{EFAFB233-063F-42B5-8137-9DF3F51BA10A}">
+      <p15:sldGuideLst xmlns:p15="http://schemas.microsoft.com/office/powerpoint/2012/main"/>
+    </p:ext>
+  </p:extLst>
 </p:presentation>
 </file>
 
@@ -261,7 +266,7 @@
           <a:p>
             <a:fld id="{7E5197F0-50BA-46ED-B704-23702634247F}" type="datetimeFigureOut">
               <a:rPr lang="en-US" smtClean="0"/>
-              <a:t>11/12/2018</a:t>
+              <a:t>11/27/2018</a:t>
             </a:fld>
             <a:endParaRPr lang="en-US"/>
           </a:p>
@@ -459,7 +464,7 @@
           <a:p>
             <a:fld id="{7E5197F0-50BA-46ED-B704-23702634247F}" type="datetimeFigureOut">
               <a:rPr lang="en-US" smtClean="0"/>
-              <a:t>11/12/2018</a:t>
+              <a:t>11/27/2018</a:t>
             </a:fld>
             <a:endParaRPr lang="en-US"/>
           </a:p>
@@ -667,7 +672,7 @@
           <a:p>
             <a:fld id="{7E5197F0-50BA-46ED-B704-23702634247F}" type="datetimeFigureOut">
               <a:rPr lang="en-US" smtClean="0"/>
-              <a:t>11/12/2018</a:t>
+              <a:t>11/27/2018</a:t>
             </a:fld>
             <a:endParaRPr lang="en-US"/>
           </a:p>
@@ -865,7 +870,7 @@
           <a:p>
             <a:fld id="{7E5197F0-50BA-46ED-B704-23702634247F}" type="datetimeFigureOut">
               <a:rPr lang="en-US" smtClean="0"/>
-              <a:t>11/12/2018</a:t>
+              <a:t>11/27/2018</a:t>
             </a:fld>
             <a:endParaRPr lang="en-US"/>
           </a:p>
@@ -1140,7 +1145,7 @@
           <a:p>
             <a:fld id="{7E5197F0-50BA-46ED-B704-23702634247F}" type="datetimeFigureOut">
               <a:rPr lang="en-US" smtClean="0"/>
-              <a:t>11/12/2018</a:t>
+              <a:t>11/27/2018</a:t>
             </a:fld>
             <a:endParaRPr lang="en-US"/>
           </a:p>
@@ -1405,7 +1410,7 @@
           <a:p>
             <a:fld id="{7E5197F0-50BA-46ED-B704-23702634247F}" type="datetimeFigureOut">
               <a:rPr lang="en-US" smtClean="0"/>
-              <a:t>11/12/2018</a:t>
+              <a:t>11/27/2018</a:t>
             </a:fld>
             <a:endParaRPr lang="en-US"/>
           </a:p>
@@ -1817,7 +1822,7 @@
           <a:p>
             <a:fld id="{7E5197F0-50BA-46ED-B704-23702634247F}" type="datetimeFigureOut">
               <a:rPr lang="en-US" smtClean="0"/>
-              <a:t>11/12/2018</a:t>
+              <a:t>11/27/2018</a:t>
             </a:fld>
             <a:endParaRPr lang="en-US"/>
           </a:p>
@@ -1958,7 +1963,7 @@
           <a:p>
             <a:fld id="{7E5197F0-50BA-46ED-B704-23702634247F}" type="datetimeFigureOut">
               <a:rPr lang="en-US" smtClean="0"/>
-              <a:t>11/12/2018</a:t>
+              <a:t>11/27/2018</a:t>
             </a:fld>
             <a:endParaRPr lang="en-US"/>
           </a:p>
@@ -2071,7 +2076,7 @@
           <a:p>
             <a:fld id="{7E5197F0-50BA-46ED-B704-23702634247F}" type="datetimeFigureOut">
               <a:rPr lang="en-US" smtClean="0"/>
-              <a:t>11/12/2018</a:t>
+              <a:t>11/27/2018</a:t>
             </a:fld>
             <a:endParaRPr lang="en-US"/>
           </a:p>
@@ -2382,7 +2387,7 @@
           <a:p>
             <a:fld id="{7E5197F0-50BA-46ED-B704-23702634247F}" type="datetimeFigureOut">
               <a:rPr lang="en-US" smtClean="0"/>
-              <a:t>11/12/2018</a:t>
+              <a:t>11/27/2018</a:t>
             </a:fld>
             <a:endParaRPr lang="en-US"/>
           </a:p>
@@ -2670,7 +2675,7 @@
           <a:p>
             <a:fld id="{7E5197F0-50BA-46ED-B704-23702634247F}" type="datetimeFigureOut">
               <a:rPr lang="en-US" smtClean="0"/>
-              <a:t>11/12/2018</a:t>
+              <a:t>11/27/2018</a:t>
             </a:fld>
             <a:endParaRPr lang="en-US"/>
           </a:p>
@@ -2911,7 +2916,7 @@
           <a:p>
             <a:fld id="{7E5197F0-50BA-46ED-B704-23702634247F}" type="datetimeFigureOut">
               <a:rPr lang="en-US" smtClean="0"/>
-              <a:t>11/12/2018</a:t>
+              <a:t>11/27/2018</a:t>
             </a:fld>
             <a:endParaRPr lang="en-US"/>
           </a:p>
@@ -4183,7 +4188,7 @@
         <p:spPr>
           <a:xfrm>
             <a:off x="838200" y="1825625"/>
-            <a:ext cx="5892264" cy="4351338"/>
+            <a:ext cx="4079033" cy="4351338"/>
           </a:xfrm>
         </p:spPr>
         <p:txBody>
@@ -4206,24 +4211,31 @@
             <a:pPr lvl="1"/>
             <a:r>
               <a:rPr lang="en-US" dirty="0"/>
-              <a:t>Should see title and buttons centered in screen</a:t>
+              <a:t>Loading screen should appear first</a:t>
             </a:r>
           </a:p>
           <a:p>
             <a:pPr lvl="1"/>
             <a:r>
               <a:rPr lang="en-US" dirty="0"/>
-              <a:t>A message should appear telling you that the audio files have been loaded</a:t>
+              <a:t>Should see title and buttons centered in screen after</a:t>
+            </a:r>
+          </a:p>
+          <a:p>
+            <a:pPr lvl="1"/>
+            <a:r>
+              <a:rPr lang="en-US" dirty="0"/>
+              <a:t>Drum beat should start</a:t>
             </a:r>
           </a:p>
         </p:txBody>
       </p:sp>
       <p:pic>
         <p:nvPicPr>
-          <p:cNvPr id="4" name="Picture 3">
-            <a:extLst>
-              <a:ext uri="{FF2B5EF4-FFF2-40B4-BE49-F238E27FC236}">
-                <a16:creationId xmlns:a16="http://schemas.microsoft.com/office/drawing/2014/main" id="{891010E6-3CEE-4026-8896-A26FA2652A75}"/>
+          <p:cNvPr id="5" name="Picture 4">
+            <a:extLst>
+              <a:ext uri="{FF2B5EF4-FFF2-40B4-BE49-F238E27FC236}">
+                <a16:creationId xmlns:a16="http://schemas.microsoft.com/office/drawing/2014/main" id="{F6B9F7FD-EA87-4288-8E80-1088D736072F}"/>
               </a:ext>
             </a:extLst>
           </p:cNvPr>
@@ -4240,8 +4252,38 @@
         </p:blipFill>
         <p:spPr>
           <a:xfrm>
-            <a:off x="7100597" y="1132910"/>
-            <a:ext cx="3883070" cy="4832886"/>
+            <a:off x="5232900" y="1646585"/>
+            <a:ext cx="3350435" cy="3564561"/>
+          </a:xfrm>
+          <a:prstGeom prst="rect">
+            <a:avLst/>
+          </a:prstGeom>
+        </p:spPr>
+      </p:pic>
+      <p:pic>
+        <p:nvPicPr>
+          <p:cNvPr id="6" name="Picture 5">
+            <a:extLst>
+              <a:ext uri="{FF2B5EF4-FFF2-40B4-BE49-F238E27FC236}">
+                <a16:creationId xmlns:a16="http://schemas.microsoft.com/office/drawing/2014/main" id="{50D2669B-82A9-499C-96BC-53BD4DAFFF3F}"/>
+              </a:ext>
+            </a:extLst>
+          </p:cNvPr>
+          <p:cNvPicPr>
+            <a:picLocks noChangeAspect="1"/>
+          </p:cNvPicPr>
+          <p:nvPr/>
+        </p:nvPicPr>
+        <p:blipFill>
+          <a:blip r:embed="rId4"/>
+          <a:stretch>
+            <a:fillRect/>
+          </a:stretch>
+        </p:blipFill>
+        <p:spPr>
+          <a:xfrm>
+            <a:off x="8648731" y="1646853"/>
+            <a:ext cx="3350435" cy="3564293"/>
           </a:xfrm>
           <a:prstGeom prst="rect">
             <a:avLst/>
@@ -4358,14 +4400,21 @@
               <a:t>Sound should be in sync no matter how irregular clicks are made</a:t>
             </a:r>
           </a:p>
+          <a:p>
+            <a:pPr lvl="1"/>
+            <a:r>
+              <a:rPr lang="en-US" dirty="0"/>
+              <a:t>Gain and pan sliders should work</a:t>
+            </a:r>
+          </a:p>
         </p:txBody>
       </p:sp>
       <p:pic>
         <p:nvPicPr>
-          <p:cNvPr id="4" name="Picture 3">
-            <a:extLst>
-              <a:ext uri="{FF2B5EF4-FFF2-40B4-BE49-F238E27FC236}">
-                <a16:creationId xmlns:a16="http://schemas.microsoft.com/office/drawing/2014/main" id="{1C252AD4-2BA1-4D85-BA3F-E008D50DFBDE}"/>
+          <p:cNvPr id="6" name="Picture 5">
+            <a:extLst>
+              <a:ext uri="{FF2B5EF4-FFF2-40B4-BE49-F238E27FC236}">
+                <a16:creationId xmlns:a16="http://schemas.microsoft.com/office/drawing/2014/main" id="{3E3BA4A3-175F-4445-BD42-A26BAA9D7602}"/>
               </a:ext>
             </a:extLst>
           </p:cNvPr>
@@ -4382,8 +4431,8 @@
         </p:blipFill>
         <p:spPr>
           <a:xfrm>
-            <a:off x="5607698" y="1690688"/>
-            <a:ext cx="6234180" cy="3820234"/>
+            <a:off x="5592147" y="1825625"/>
+            <a:ext cx="6096000" cy="3248904"/>
           </a:xfrm>
           <a:prstGeom prst="rect">
             <a:avLst/>

</xml_diff>